<commit_message>
moved presentation to correct folder week 1
</commit_message>
<xml_diff>
--- a/week01/statistics project.pptx
+++ b/week01/statistics project.pptx
@@ -8,32 +8,29 @@
     <p:sldId id="256" r:id="rId2"/>
     <p:sldId id="257" r:id="rId3"/>
     <p:sldId id="271" r:id="rId4"/>
-    <p:sldId id="275" r:id="rId5"/>
-    <p:sldId id="272" r:id="rId6"/>
-    <p:sldId id="273" r:id="rId7"/>
-    <p:sldId id="274" r:id="rId8"/>
-    <p:sldId id="267" r:id="rId9"/>
-    <p:sldId id="277" r:id="rId10"/>
-    <p:sldId id="276" r:id="rId11"/>
+    <p:sldId id="272" r:id="rId5"/>
+    <p:sldId id="273" r:id="rId6"/>
+    <p:sldId id="274" r:id="rId7"/>
+    <p:sldId id="267" r:id="rId8"/>
   </p:sldIdLst>
   <p:sldSz cx="18288000" cy="10287000"/>
   <p:notesSz cx="6858000" cy="9144000"/>
   <p:embeddedFontLst>
     <p:embeddedFont>
       <p:font typeface="Boriboon" panose="020B0604020202020204" charset="-34"/>
-      <p:regular r:id="rId12"/>
+      <p:regular r:id="rId9"/>
     </p:embeddedFont>
     <p:embeddedFont>
       <p:font typeface="Boriboon Bold" panose="020B0604020202020204" charset="-34"/>
-      <p:regular r:id="rId13"/>
+      <p:regular r:id="rId10"/>
     </p:embeddedFont>
     <p:embeddedFont>
       <p:font typeface="Loubag" panose="020B0604020202020204" charset="0"/>
-      <p:regular r:id="rId14"/>
+      <p:regular r:id="rId11"/>
     </p:embeddedFont>
     <p:embeddedFont>
       <p:font typeface="Loubag Bold" panose="020B0604020202020204" charset="0"/>
-      <p:regular r:id="rId15"/>
+      <p:regular r:id="rId12"/>
     </p:embeddedFont>
   </p:embeddedFontLst>
   <p:defaultTextStyle>
@@ -373,7 +370,7 @@
             <a:fld id="{B6F15528-21DE-4FAA-801E-634DDDAF4B2B}" type="slidenum">
               <a:rPr lang="en-US" smtClean="0"/>
               <a:pPr/>
-              <a:t>‹Nr.›</a:t>
+              <a:t>‹#›</a:t>
             </a:fld>
             <a:endParaRPr lang="en-US"/>
           </a:p>
@@ -538,7 +535,7 @@
             <a:fld id="{B6F15528-21DE-4FAA-801E-634DDDAF4B2B}" type="slidenum">
               <a:rPr lang="en-US" smtClean="0"/>
               <a:pPr/>
-              <a:t>‹Nr.›</a:t>
+              <a:t>‹#›</a:t>
             </a:fld>
             <a:endParaRPr lang="en-US"/>
           </a:p>
@@ -713,7 +710,7 @@
             <a:fld id="{B6F15528-21DE-4FAA-801E-634DDDAF4B2B}" type="slidenum">
               <a:rPr lang="en-US" smtClean="0"/>
               <a:pPr/>
-              <a:t>‹Nr.›</a:t>
+              <a:t>‹#›</a:t>
             </a:fld>
             <a:endParaRPr lang="en-US"/>
           </a:p>
@@ -878,7 +875,7 @@
             <a:fld id="{B6F15528-21DE-4FAA-801E-634DDDAF4B2B}" type="slidenum">
               <a:rPr lang="en-US" smtClean="0"/>
               <a:pPr/>
-              <a:t>‹Nr.›</a:t>
+              <a:t>‹#›</a:t>
             </a:fld>
             <a:endParaRPr lang="en-US"/>
           </a:p>
@@ -1120,7 +1117,7 @@
             <a:fld id="{B6F15528-21DE-4FAA-801E-634DDDAF4B2B}" type="slidenum">
               <a:rPr lang="en-US" smtClean="0"/>
               <a:pPr/>
-              <a:t>‹Nr.›</a:t>
+              <a:t>‹#›</a:t>
             </a:fld>
             <a:endParaRPr lang="en-US"/>
           </a:p>
@@ -1402,7 +1399,7 @@
             <a:fld id="{B6F15528-21DE-4FAA-801E-634DDDAF4B2B}" type="slidenum">
               <a:rPr lang="en-US" smtClean="0"/>
               <a:pPr/>
-              <a:t>‹Nr.›</a:t>
+              <a:t>‹#›</a:t>
             </a:fld>
             <a:endParaRPr lang="en-US"/>
           </a:p>
@@ -1818,7 +1815,7 @@
             <a:fld id="{B6F15528-21DE-4FAA-801E-634DDDAF4B2B}" type="slidenum">
               <a:rPr lang="en-US" smtClean="0"/>
               <a:pPr/>
-              <a:t>‹Nr.›</a:t>
+              <a:t>‹#›</a:t>
             </a:fld>
             <a:endParaRPr lang="en-US"/>
           </a:p>
@@ -1932,7 +1929,7 @@
             <a:fld id="{B6F15528-21DE-4FAA-801E-634DDDAF4B2B}" type="slidenum">
               <a:rPr lang="en-US" smtClean="0"/>
               <a:pPr/>
-              <a:t>‹Nr.›</a:t>
+              <a:t>‹#›</a:t>
             </a:fld>
             <a:endParaRPr lang="en-US"/>
           </a:p>
@@ -2024,7 +2021,7 @@
             <a:fld id="{B6F15528-21DE-4FAA-801E-634DDDAF4B2B}" type="slidenum">
               <a:rPr lang="en-US" smtClean="0"/>
               <a:pPr/>
-              <a:t>‹Nr.›</a:t>
+              <a:t>‹#›</a:t>
             </a:fld>
             <a:endParaRPr lang="en-US"/>
           </a:p>
@@ -2296,7 +2293,7 @@
             <a:fld id="{B6F15528-21DE-4FAA-801E-634DDDAF4B2B}" type="slidenum">
               <a:rPr lang="en-US" smtClean="0"/>
               <a:pPr/>
-              <a:t>‹Nr.›</a:t>
+              <a:t>‹#›</a:t>
             </a:fld>
             <a:endParaRPr lang="en-US"/>
           </a:p>
@@ -2545,7 +2542,7 @@
             <a:fld id="{B6F15528-21DE-4FAA-801E-634DDDAF4B2B}" type="slidenum">
               <a:rPr lang="en-US" smtClean="0"/>
               <a:pPr/>
-              <a:t>‹Nr.›</a:t>
+              <a:t>‹#›</a:t>
             </a:fld>
             <a:endParaRPr lang="en-US"/>
           </a:p>
@@ -2789,7 +2786,7 @@
             <a:fld id="{B6F15528-21DE-4FAA-801E-634DDDAF4B2B}" type="slidenum">
               <a:rPr lang="en-US" smtClean="0"/>
               <a:pPr/>
-              <a:t>‹Nr.›</a:t>
+              <a:t>‹#›</a:t>
             </a:fld>
             <a:endParaRPr lang="en-US"/>
           </a:p>
@@ -3134,13 +3131,6 @@
             </a:stretch>
           </a:blipFill>
         </p:spPr>
-        <p:txBody>
-          <a:bodyPr/>
-          <a:lstStyle/>
-          <a:p>
-            <a:endParaRPr lang="de-DE"/>
-          </a:p>
-        </p:txBody>
       </p:sp>
       <p:sp>
         <p:nvSpPr>
@@ -3187,13 +3177,6 @@
             </a:stretch>
           </a:blipFill>
         </p:spPr>
-        <p:txBody>
-          <a:bodyPr/>
-          <a:lstStyle/>
-          <a:p>
-            <a:endParaRPr lang="de-DE"/>
-          </a:p>
-        </p:txBody>
       </p:sp>
       <p:sp>
         <p:nvSpPr>
@@ -3240,13 +3223,6 @@
             </a:stretch>
           </a:blipFill>
         </p:spPr>
-        <p:txBody>
-          <a:bodyPr/>
-          <a:lstStyle/>
-          <a:p>
-            <a:endParaRPr lang="de-DE"/>
-          </a:p>
-        </p:txBody>
       </p:sp>
       <p:sp>
         <p:nvSpPr>
@@ -3293,13 +3269,6 @@
             </a:stretch>
           </a:blipFill>
         </p:spPr>
-        <p:txBody>
-          <a:bodyPr/>
-          <a:lstStyle/>
-          <a:p>
-            <a:endParaRPr lang="de-DE"/>
-          </a:p>
-        </p:txBody>
       </p:sp>
       <p:sp>
         <p:nvSpPr>
@@ -3346,13 +3315,6 @@
             </a:stretch>
           </a:blipFill>
         </p:spPr>
-        <p:txBody>
-          <a:bodyPr/>
-          <a:lstStyle/>
-          <a:p>
-            <a:endParaRPr lang="de-DE"/>
-          </a:p>
-        </p:txBody>
       </p:sp>
       <p:sp>
         <p:nvSpPr>
@@ -3399,13 +3361,6 @@
             </a:stretch>
           </a:blipFill>
         </p:spPr>
-        <p:txBody>
-          <a:bodyPr/>
-          <a:lstStyle/>
-          <a:p>
-            <a:endParaRPr lang="de-DE"/>
-          </a:p>
-        </p:txBody>
       </p:sp>
       <p:sp>
         <p:nvSpPr>
@@ -3452,13 +3407,6 @@
             </a:stretch>
           </a:blipFill>
         </p:spPr>
-        <p:txBody>
-          <a:bodyPr/>
-          <a:lstStyle/>
-          <a:p>
-            <a:endParaRPr lang="de-DE"/>
-          </a:p>
-        </p:txBody>
       </p:sp>
       <p:sp>
         <p:nvSpPr>
@@ -3505,13 +3453,6 @@
             </a:stretch>
           </a:blipFill>
         </p:spPr>
-        <p:txBody>
-          <a:bodyPr/>
-          <a:lstStyle/>
-          <a:p>
-            <a:endParaRPr lang="de-DE"/>
-          </a:p>
-        </p:txBody>
       </p:sp>
       <p:sp>
         <p:nvSpPr>
@@ -3558,13 +3499,6 @@
             </a:stretch>
           </a:blipFill>
         </p:spPr>
-        <p:txBody>
-          <a:bodyPr/>
-          <a:lstStyle/>
-          <a:p>
-            <a:endParaRPr lang="de-DE"/>
-          </a:p>
-        </p:txBody>
       </p:sp>
       <p:sp>
         <p:nvSpPr>
@@ -3690,637 +3624,6 @@
         </p:txBody>
       </p:sp>
     </p:spTree>
-  </p:cSld>
-  <p:clrMapOvr>
-    <a:masterClrMapping/>
-  </p:clrMapOvr>
-</p:sld>
-</file>
-
-<file path=ppt/slides/slide10.xml><?xml version="1.0" encoding="utf-8"?>
-<p:sld xmlns:a="http://schemas.openxmlformats.org/drawingml/2006/main" xmlns:r="http://schemas.openxmlformats.org/officeDocument/2006/relationships" xmlns:p="http://schemas.openxmlformats.org/presentationml/2006/main">
-  <p:cSld>
-    <p:bg>
-      <p:bgPr>
-        <a:solidFill>
-          <a:schemeClr val="bg1"/>
-        </a:solidFill>
-        <a:effectLst/>
-      </p:bgPr>
-    </p:bg>
-    <p:spTree>
-      <p:nvGrpSpPr>
-        <p:cNvPr id="1" name="">
-          <a:extLst>
-            <a:ext uri="{FF2B5EF4-FFF2-40B4-BE49-F238E27FC236}">
-              <a16:creationId xmlns:a16="http://schemas.microsoft.com/office/drawing/2014/main" id="{7E0E3890-9481-B48E-E0A6-0B71CC42AE2F}"/>
-            </a:ext>
-          </a:extLst>
-        </p:cNvPr>
-        <p:cNvGrpSpPr/>
-        <p:nvPr/>
-      </p:nvGrpSpPr>
-      <p:grpSpPr>
-        <a:xfrm>
-          <a:off x="0" y="0"/>
-          <a:ext cx="0" cy="0"/>
-          <a:chOff x="0" y="0"/>
-          <a:chExt cx="0" cy="0"/>
-        </a:xfrm>
-      </p:grpSpPr>
-      <p:sp>
-        <p:nvSpPr>
-          <p:cNvPr id="9" name="Rectangle 8">
-            <a:extLst>
-              <a:ext uri="{FF2B5EF4-FFF2-40B4-BE49-F238E27FC236}">
-                <a16:creationId xmlns:a16="http://schemas.microsoft.com/office/drawing/2014/main" id="{71B363E7-B47B-792C-8CC0-3CEACBF54D79}"/>
-              </a:ext>
-              <a:ext uri="{C183D7F6-B498-43B3-948B-1728B52AA6E4}">
-                <adec:decorative xmlns:adec="http://schemas.microsoft.com/office/drawing/2017/decorative" val="1"/>
-              </a:ext>
-            </a:extLst>
-          </p:cNvPr>
-          <p:cNvSpPr>
-            <a:spLocks noGrp="1" noRot="1" noChangeAspect="1" noMove="1" noResize="1" noEditPoints="1" noAdjustHandles="1" noChangeArrowheads="1" noChangeShapeType="1" noTextEdit="1"/>
-          </p:cNvSpPr>
-          <p:nvPr>
-            <p:extLst>
-              <p:ext uri="{386F3935-93C4-4BCD-93E2-E3B085C9AB24}">
-                <p16:designElem xmlns:p16="http://schemas.microsoft.com/office/powerpoint/2015/main" val="1"/>
-              </p:ext>
-            </p:extLst>
-          </p:nvPr>
-        </p:nvSpPr>
-        <p:spPr>
-          <a:xfrm>
-            <a:off x="0" y="0"/>
-            <a:ext cx="18288000" cy="10287000"/>
-          </a:xfrm>
-          <a:prstGeom prst="rect">
-            <a:avLst/>
-          </a:prstGeom>
-          <a:solidFill>
-            <a:schemeClr val="bg1"/>
-          </a:solidFill>
-          <a:ln>
-            <a:noFill/>
-          </a:ln>
-        </p:spPr>
-        <p:style>
-          <a:lnRef idx="2">
-            <a:schemeClr val="accent1">
-              <a:shade val="50000"/>
-            </a:schemeClr>
-          </a:lnRef>
-          <a:fillRef idx="1">
-            <a:schemeClr val="accent1"/>
-          </a:fillRef>
-          <a:effectRef idx="0">
-            <a:schemeClr val="accent1"/>
-          </a:effectRef>
-          <a:fontRef idx="minor">
-            <a:schemeClr val="lt1"/>
-          </a:fontRef>
-        </p:style>
-        <p:txBody>
-          <a:bodyPr rtlCol="0" anchor="ctr"/>
-          <a:lstStyle/>
-          <a:p>
-            <a:pPr algn="ctr"/>
-            <a:endParaRPr lang="en-US" dirty="0"/>
-          </a:p>
-        </p:txBody>
-      </p:sp>
-      <p:sp>
-        <p:nvSpPr>
-          <p:cNvPr id="11" name="Freeform: Shape 10">
-            <a:extLst>
-              <a:ext uri="{FF2B5EF4-FFF2-40B4-BE49-F238E27FC236}">
-                <a16:creationId xmlns:a16="http://schemas.microsoft.com/office/drawing/2014/main" id="{7FA70A59-EBF3-B4FB-8A7F-CC999BA3FB2B}"/>
-              </a:ext>
-              <a:ext uri="{C183D7F6-B498-43B3-948B-1728B52AA6E4}">
-                <adec:decorative xmlns:adec="http://schemas.microsoft.com/office/drawing/2017/decorative" val="1"/>
-              </a:ext>
-            </a:extLst>
-          </p:cNvPr>
-          <p:cNvSpPr>
-            <a:spLocks noGrp="1" noRot="1" noChangeAspect="1" noMove="1" noResize="1" noEditPoints="1" noAdjustHandles="1" noChangeArrowheads="1" noChangeShapeType="1" noTextEdit="1"/>
-          </p:cNvSpPr>
-          <p:nvPr>
-            <p:extLst>
-              <p:ext uri="{386F3935-93C4-4BCD-93E2-E3B085C9AB24}">
-                <p16:designElem xmlns:p16="http://schemas.microsoft.com/office/powerpoint/2015/main" val="1"/>
-              </p:ext>
-            </p:extLst>
-          </p:nvPr>
-        </p:nvSpPr>
-        <p:spPr>
-          <a:xfrm rot="18900000" flipH="1">
-            <a:off x="-564234" y="-380505"/>
-            <a:ext cx="2741457" cy="2065483"/>
-          </a:xfrm>
-          <a:custGeom>
-            <a:avLst/>
-            <a:gdLst>
-              <a:gd name="connsiteX0" fmla="*/ 0 w 1827638"/>
-              <a:gd name="connsiteY0" fmla="*/ 987379 h 1376989"/>
-              <a:gd name="connsiteX1" fmla="*/ 987379 w 1827638"/>
-              <a:gd name="connsiteY1" fmla="*/ 0 h 1376989"/>
-              <a:gd name="connsiteX2" fmla="*/ 1827638 w 1827638"/>
-              <a:gd name="connsiteY2" fmla="*/ 840260 h 1376989"/>
-              <a:gd name="connsiteX3" fmla="*/ 1827638 w 1827638"/>
-              <a:gd name="connsiteY3" fmla="*/ 1376989 h 1376989"/>
-              <a:gd name="connsiteX4" fmla="*/ 0 w 1827638"/>
-              <a:gd name="connsiteY4" fmla="*/ 1376989 h 1376989"/>
-            </a:gdLst>
-            <a:ahLst/>
-            <a:cxnLst>
-              <a:cxn ang="0">
-                <a:pos x="connsiteX0" y="connsiteY0"/>
-              </a:cxn>
-              <a:cxn ang="0">
-                <a:pos x="connsiteX1" y="connsiteY1"/>
-              </a:cxn>
-              <a:cxn ang="0">
-                <a:pos x="connsiteX2" y="connsiteY2"/>
-              </a:cxn>
-              <a:cxn ang="0">
-                <a:pos x="connsiteX3" y="connsiteY3"/>
-              </a:cxn>
-              <a:cxn ang="0">
-                <a:pos x="connsiteX4" y="connsiteY4"/>
-              </a:cxn>
-            </a:cxnLst>
-            <a:rect l="l" t="t" r="r" b="b"/>
-            <a:pathLst>
-              <a:path w="1827638" h="1376989">
-                <a:moveTo>
-                  <a:pt x="0" y="987379"/>
-                </a:moveTo>
-                <a:lnTo>
-                  <a:pt x="987379" y="0"/>
-                </a:lnTo>
-                <a:lnTo>
-                  <a:pt x="1827638" y="840260"/>
-                </a:lnTo>
-                <a:lnTo>
-                  <a:pt x="1827638" y="1376989"/>
-                </a:lnTo>
-                <a:lnTo>
-                  <a:pt x="0" y="1376989"/>
-                </a:lnTo>
-                <a:close/>
-              </a:path>
-            </a:pathLst>
-          </a:custGeom>
-          <a:solidFill>
-            <a:schemeClr val="accent1">
-              <a:alpha val="30000"/>
-            </a:schemeClr>
-          </a:solidFill>
-          <a:ln>
-            <a:noFill/>
-          </a:ln>
-        </p:spPr>
-        <p:style>
-          <a:lnRef idx="2">
-            <a:schemeClr val="accent1">
-              <a:shade val="50000"/>
-            </a:schemeClr>
-          </a:lnRef>
-          <a:fillRef idx="1">
-            <a:schemeClr val="accent1"/>
-          </a:fillRef>
-          <a:effectRef idx="0">
-            <a:schemeClr val="accent1"/>
-          </a:effectRef>
-          <a:fontRef idx="minor">
-            <a:schemeClr val="lt1"/>
-          </a:fontRef>
-        </p:style>
-        <p:txBody>
-          <a:bodyPr rtlCol="0" anchor="ctr"/>
-          <a:lstStyle/>
-          <a:p>
-            <a:pPr algn="ctr"/>
-            <a:endParaRPr lang="en-US" dirty="0"/>
-          </a:p>
-        </p:txBody>
-      </p:sp>
-      <p:sp>
-        <p:nvSpPr>
-          <p:cNvPr id="13" name="Rectangle 12">
-            <a:extLst>
-              <a:ext uri="{FF2B5EF4-FFF2-40B4-BE49-F238E27FC236}">
-                <a16:creationId xmlns:a16="http://schemas.microsoft.com/office/drawing/2014/main" id="{F57B748E-E9D2-F0C4-6F78-3842CC268C36}"/>
-              </a:ext>
-              <a:ext uri="{C183D7F6-B498-43B3-948B-1728B52AA6E4}">
-                <adec:decorative xmlns:adec="http://schemas.microsoft.com/office/drawing/2017/decorative" val="1"/>
-              </a:ext>
-            </a:extLst>
-          </p:cNvPr>
-          <p:cNvSpPr>
-            <a:spLocks noGrp="1" noRot="1" noChangeAspect="1" noMove="1" noResize="1" noEditPoints="1" noAdjustHandles="1" noChangeArrowheads="1" noChangeShapeType="1" noTextEdit="1"/>
-          </p:cNvSpPr>
-          <p:nvPr>
-            <p:extLst>
-              <p:ext uri="{386F3935-93C4-4BCD-93E2-E3B085C9AB24}">
-                <p16:designElem xmlns:p16="http://schemas.microsoft.com/office/powerpoint/2015/main" val="1"/>
-              </p:ext>
-            </p:extLst>
-          </p:nvPr>
-        </p:nvSpPr>
-        <p:spPr>
-          <a:xfrm rot="18900000" flipH="1">
-            <a:off x="1337461" y="633219"/>
-            <a:ext cx="968052" cy="968052"/>
-          </a:xfrm>
-          <a:prstGeom prst="rect">
-            <a:avLst/>
-          </a:prstGeom>
-          <a:solidFill>
-            <a:schemeClr val="accent1">
-              <a:alpha val="30000"/>
-            </a:schemeClr>
-          </a:solidFill>
-          <a:ln>
-            <a:noFill/>
-          </a:ln>
-        </p:spPr>
-        <p:style>
-          <a:lnRef idx="2">
-            <a:schemeClr val="accent1">
-              <a:shade val="50000"/>
-            </a:schemeClr>
-          </a:lnRef>
-          <a:fillRef idx="1">
-            <a:schemeClr val="accent1"/>
-          </a:fillRef>
-          <a:effectRef idx="0">
-            <a:schemeClr val="accent1"/>
-          </a:effectRef>
-          <a:fontRef idx="minor">
-            <a:schemeClr val="lt1"/>
-          </a:fontRef>
-        </p:style>
-        <p:txBody>
-          <a:bodyPr rtlCol="0" anchor="ctr"/>
-          <a:lstStyle/>
-          <a:p>
-            <a:pPr algn="ctr"/>
-            <a:endParaRPr lang="en-US"/>
-          </a:p>
-        </p:txBody>
-      </p:sp>
-      <p:sp>
-        <p:nvSpPr>
-          <p:cNvPr id="15" name="Rectangle 14">
-            <a:extLst>
-              <a:ext uri="{FF2B5EF4-FFF2-40B4-BE49-F238E27FC236}">
-                <a16:creationId xmlns:a16="http://schemas.microsoft.com/office/drawing/2014/main" id="{C57F8A63-9A1E-6E02-DAA7-12EC609A4737}"/>
-              </a:ext>
-              <a:ext uri="{C183D7F6-B498-43B3-948B-1728B52AA6E4}">
-                <adec:decorative xmlns:adec="http://schemas.microsoft.com/office/drawing/2017/decorative" val="1"/>
-              </a:ext>
-            </a:extLst>
-          </p:cNvPr>
-          <p:cNvSpPr>
-            <a:spLocks noGrp="1" noRot="1" noChangeAspect="1" noMove="1" noResize="1" noEditPoints="1" noAdjustHandles="1" noChangeArrowheads="1" noChangeShapeType="1" noTextEdit="1"/>
-          </p:cNvSpPr>
-          <p:nvPr>
-            <p:extLst>
-              <p:ext uri="{386F3935-93C4-4BCD-93E2-E3B085C9AB24}">
-                <p16:designElem xmlns:p16="http://schemas.microsoft.com/office/powerpoint/2015/main" val="1"/>
-              </p:ext>
-            </p:extLst>
-          </p:nvPr>
-        </p:nvSpPr>
-        <p:spPr>
-          <a:xfrm rot="18900000" flipH="1">
-            <a:off x="15065223" y="982710"/>
-            <a:ext cx="1031208" cy="1031208"/>
-          </a:xfrm>
-          <a:prstGeom prst="rect">
-            <a:avLst/>
-          </a:prstGeom>
-          <a:solidFill>
-            <a:schemeClr val="accent4">
-              <a:alpha val="30000"/>
-            </a:schemeClr>
-          </a:solidFill>
-          <a:ln>
-            <a:noFill/>
-          </a:ln>
-        </p:spPr>
-        <p:style>
-          <a:lnRef idx="2">
-            <a:schemeClr val="accent1">
-              <a:shade val="50000"/>
-            </a:schemeClr>
-          </a:lnRef>
-          <a:fillRef idx="1">
-            <a:schemeClr val="accent1"/>
-          </a:fillRef>
-          <a:effectRef idx="0">
-            <a:schemeClr val="accent1"/>
-          </a:effectRef>
-          <a:fontRef idx="minor">
-            <a:schemeClr val="lt1"/>
-          </a:fontRef>
-        </p:style>
-        <p:txBody>
-          <a:bodyPr rtlCol="0" anchor="ctr"/>
-          <a:lstStyle/>
-          <a:p>
-            <a:pPr algn="ctr"/>
-            <a:endParaRPr lang="en-US"/>
-          </a:p>
-        </p:txBody>
-      </p:sp>
-      <p:sp>
-        <p:nvSpPr>
-          <p:cNvPr id="17" name="Freeform: Shape 16">
-            <a:extLst>
-              <a:ext uri="{FF2B5EF4-FFF2-40B4-BE49-F238E27FC236}">
-                <a16:creationId xmlns:a16="http://schemas.microsoft.com/office/drawing/2014/main" id="{DDFEA87A-38B2-EFA7-9642-7ABF144A3558}"/>
-              </a:ext>
-              <a:ext uri="{C183D7F6-B498-43B3-948B-1728B52AA6E4}">
-                <adec:decorative xmlns:adec="http://schemas.microsoft.com/office/drawing/2017/decorative" val="1"/>
-              </a:ext>
-            </a:extLst>
-          </p:cNvPr>
-          <p:cNvSpPr>
-            <a:spLocks noGrp="1" noRot="1" noChangeAspect="1" noMove="1" noResize="1" noEditPoints="1" noAdjustHandles="1" noChangeArrowheads="1" noChangeShapeType="1" noTextEdit="1"/>
-          </p:cNvSpPr>
-          <p:nvPr>
-            <p:extLst>
-              <p:ext uri="{386F3935-93C4-4BCD-93E2-E3B085C9AB24}">
-                <p16:designElem xmlns:p16="http://schemas.microsoft.com/office/powerpoint/2015/main" val="1"/>
-              </p:ext>
-            </p:extLst>
-          </p:nvPr>
-        </p:nvSpPr>
-        <p:spPr>
-          <a:xfrm rot="10800000" flipH="1">
-            <a:off x="14034964" y="0"/>
-            <a:ext cx="4253036" cy="2221255"/>
-          </a:xfrm>
-          <a:custGeom>
-            <a:avLst/>
-            <a:gdLst>
-              <a:gd name="connsiteX0" fmla="*/ 2835357 w 2835357"/>
-              <a:gd name="connsiteY0" fmla="*/ 1480837 h 1480837"/>
-              <a:gd name="connsiteX1" fmla="*/ 0 w 2835357"/>
-              <a:gd name="connsiteY1" fmla="*/ 1480837 h 1480837"/>
-              <a:gd name="connsiteX2" fmla="*/ 1552727 w 2835357"/>
-              <a:gd name="connsiteY2" fmla="*/ 0 h 1480837"/>
-              <a:gd name="connsiteX3" fmla="*/ 2835357 w 2835357"/>
-              <a:gd name="connsiteY3" fmla="*/ 1223245 h 1480837"/>
-            </a:gdLst>
-            <a:ahLst/>
-            <a:cxnLst>
-              <a:cxn ang="0">
-                <a:pos x="connsiteX0" y="connsiteY0"/>
-              </a:cxn>
-              <a:cxn ang="0">
-                <a:pos x="connsiteX1" y="connsiteY1"/>
-              </a:cxn>
-              <a:cxn ang="0">
-                <a:pos x="connsiteX2" y="connsiteY2"/>
-              </a:cxn>
-              <a:cxn ang="0">
-                <a:pos x="connsiteX3" y="connsiteY3"/>
-              </a:cxn>
-            </a:cxnLst>
-            <a:rect l="l" t="t" r="r" b="b"/>
-            <a:pathLst>
-              <a:path w="2835357" h="1480837">
-                <a:moveTo>
-                  <a:pt x="2835357" y="1480837"/>
-                </a:moveTo>
-                <a:lnTo>
-                  <a:pt x="0" y="1480837"/>
-                </a:lnTo>
-                <a:lnTo>
-                  <a:pt x="1552727" y="0"/>
-                </a:lnTo>
-                <a:lnTo>
-                  <a:pt x="2835357" y="1223245"/>
-                </a:lnTo>
-                <a:close/>
-              </a:path>
-            </a:pathLst>
-          </a:custGeom>
-          <a:solidFill>
-            <a:schemeClr val="accent4">
-              <a:alpha val="30000"/>
-            </a:schemeClr>
-          </a:solidFill>
-          <a:ln>
-            <a:noFill/>
-          </a:ln>
-        </p:spPr>
-        <p:style>
-          <a:lnRef idx="2">
-            <a:schemeClr val="accent1">
-              <a:shade val="50000"/>
-            </a:schemeClr>
-          </a:lnRef>
-          <a:fillRef idx="1">
-            <a:schemeClr val="accent1"/>
-          </a:fillRef>
-          <a:effectRef idx="0">
-            <a:schemeClr val="accent1"/>
-          </a:effectRef>
-          <a:fontRef idx="minor">
-            <a:schemeClr val="lt1"/>
-          </a:fontRef>
-        </p:style>
-        <p:txBody>
-          <a:bodyPr wrap="square" rtlCol="0" anchor="ctr">
-            <a:noAutofit/>
-          </a:bodyPr>
-          <a:lstStyle/>
-          <a:p>
-            <a:pPr algn="ctr"/>
-            <a:endParaRPr lang="en-US" dirty="0"/>
-          </a:p>
-        </p:txBody>
-      </p:sp>
-      <p:sp>
-        <p:nvSpPr>
-          <p:cNvPr id="19" name="Isosceles Triangle 18">
-            <a:extLst>
-              <a:ext uri="{FF2B5EF4-FFF2-40B4-BE49-F238E27FC236}">
-                <a16:creationId xmlns:a16="http://schemas.microsoft.com/office/drawing/2014/main" id="{EF200ADE-1556-D598-DE21-16D07F43E746}"/>
-              </a:ext>
-              <a:ext uri="{C183D7F6-B498-43B3-948B-1728B52AA6E4}">
-                <adec:decorative xmlns:adec="http://schemas.microsoft.com/office/drawing/2017/decorative" val="1"/>
-              </a:ext>
-            </a:extLst>
-          </p:cNvPr>
-          <p:cNvSpPr>
-            <a:spLocks noGrp="1" noRot="1" noChangeAspect="1" noMove="1" noResize="1" noEditPoints="1" noAdjustHandles="1" noChangeArrowheads="1" noChangeShapeType="1" noTextEdit="1"/>
-          </p:cNvSpPr>
-          <p:nvPr>
-            <p:extLst>
-              <p:ext uri="{386F3935-93C4-4BCD-93E2-E3B085C9AB24}">
-                <p16:designElem xmlns:p16="http://schemas.microsoft.com/office/powerpoint/2015/main" val="1"/>
-              </p:ext>
-            </p:extLst>
-          </p:nvPr>
-        </p:nvSpPr>
-        <p:spPr>
-          <a:xfrm flipH="1">
-            <a:off x="11964516" y="9173251"/>
-            <a:ext cx="2241769" cy="1113749"/>
-          </a:xfrm>
-          <a:prstGeom prst="triangle">
-            <a:avLst/>
-          </a:prstGeom>
-          <a:solidFill>
-            <a:schemeClr val="accent1">
-              <a:alpha val="30000"/>
-            </a:schemeClr>
-          </a:solidFill>
-          <a:ln>
-            <a:noFill/>
-          </a:ln>
-        </p:spPr>
-        <p:style>
-          <a:lnRef idx="2">
-            <a:schemeClr val="accent1">
-              <a:shade val="50000"/>
-            </a:schemeClr>
-          </a:lnRef>
-          <a:fillRef idx="1">
-            <a:schemeClr val="accent1"/>
-          </a:fillRef>
-          <a:effectRef idx="0">
-            <a:schemeClr val="accent1"/>
-          </a:effectRef>
-          <a:fontRef idx="minor">
-            <a:schemeClr val="lt1"/>
-          </a:fontRef>
-        </p:style>
-        <p:txBody>
-          <a:bodyPr rtlCol="0" anchor="ctr"/>
-          <a:lstStyle/>
-          <a:p>
-            <a:pPr algn="ctr"/>
-            <a:endParaRPr lang="en-US"/>
-          </a:p>
-        </p:txBody>
-      </p:sp>
-      <p:pic>
-        <p:nvPicPr>
-          <p:cNvPr id="4" name="Picture 3">
-            <a:extLst>
-              <a:ext uri="{FF2B5EF4-FFF2-40B4-BE49-F238E27FC236}">
-                <a16:creationId xmlns:a16="http://schemas.microsoft.com/office/drawing/2014/main" id="{A83EDD4B-4A87-C2DE-7829-D05C62590D58}"/>
-              </a:ext>
-            </a:extLst>
-          </p:cNvPr>
-          <p:cNvPicPr>
-            <a:picLocks noChangeAspect="1"/>
-          </p:cNvPicPr>
-          <p:nvPr/>
-        </p:nvPicPr>
-        <p:blipFill>
-          <a:blip r:embed="rId2">
-            <a:extLst>
-              <a:ext uri="{28A0092B-C50C-407E-A947-70E740481C1C}">
-                <a14:useLocalDpi xmlns:a14="http://schemas.microsoft.com/office/drawing/2010/main" val="0"/>
-              </a:ext>
-            </a:extLst>
-          </a:blip>
-          <a:srcRect/>
-          <a:stretch/>
-        </p:blipFill>
-        <p:spPr>
-          <a:xfrm>
-            <a:off x="914400" y="-1"/>
-            <a:ext cx="16459200" cy="10286999"/>
-          </a:xfrm>
-          <a:prstGeom prst="rect">
-            <a:avLst/>
-          </a:prstGeom>
-          <a:ln>
-            <a:noFill/>
-          </a:ln>
-        </p:spPr>
-      </p:pic>
-      <p:sp>
-        <p:nvSpPr>
-          <p:cNvPr id="21" name="Isosceles Triangle 20">
-            <a:extLst>
-              <a:ext uri="{FF2B5EF4-FFF2-40B4-BE49-F238E27FC236}">
-                <a16:creationId xmlns:a16="http://schemas.microsoft.com/office/drawing/2014/main" id="{D1977EFA-17F2-F918-E7A0-B3BC71651B80}"/>
-              </a:ext>
-              <a:ext uri="{C183D7F6-B498-43B3-948B-1728B52AA6E4}">
-                <adec:decorative xmlns:adec="http://schemas.microsoft.com/office/drawing/2017/decorative" val="1"/>
-              </a:ext>
-            </a:extLst>
-          </p:cNvPr>
-          <p:cNvSpPr>
-            <a:spLocks noGrp="1" noRot="1" noChangeAspect="1" noMove="1" noResize="1" noEditPoints="1" noAdjustHandles="1" noChangeArrowheads="1" noChangeShapeType="1" noTextEdit="1"/>
-          </p:cNvSpPr>
-          <p:nvPr>
-            <p:extLst>
-              <p:ext uri="{386F3935-93C4-4BCD-93E2-E3B085C9AB24}">
-                <p16:designElem xmlns:p16="http://schemas.microsoft.com/office/powerpoint/2015/main" val="1"/>
-              </p:ext>
-            </p:extLst>
-          </p:nvPr>
-        </p:nvSpPr>
-        <p:spPr>
-          <a:xfrm flipH="1">
-            <a:off x="11406120" y="9679714"/>
-            <a:ext cx="1222354" cy="607286"/>
-          </a:xfrm>
-          <a:prstGeom prst="triangle">
-            <a:avLst/>
-          </a:prstGeom>
-          <a:solidFill>
-            <a:schemeClr val="accent1">
-              <a:alpha val="30000"/>
-            </a:schemeClr>
-          </a:solidFill>
-          <a:ln>
-            <a:noFill/>
-          </a:ln>
-        </p:spPr>
-        <p:style>
-          <a:lnRef idx="2">
-            <a:schemeClr val="accent1">
-              <a:shade val="50000"/>
-            </a:schemeClr>
-          </a:lnRef>
-          <a:fillRef idx="1">
-            <a:schemeClr val="accent1"/>
-          </a:fillRef>
-          <a:effectRef idx="0">
-            <a:schemeClr val="accent1"/>
-          </a:effectRef>
-          <a:fontRef idx="minor">
-            <a:schemeClr val="lt1"/>
-          </a:fontRef>
-        </p:style>
-        <p:txBody>
-          <a:bodyPr rtlCol="0" anchor="ctr"/>
-          <a:lstStyle/>
-          <a:p>
-            <a:pPr algn="ctr"/>
-            <a:endParaRPr lang="en-US"/>
-          </a:p>
-        </p:txBody>
-      </p:sp>
-    </p:spTree>
-    <p:extLst>
-      <p:ext uri="{BB962C8B-B14F-4D97-AF65-F5344CB8AC3E}">
-        <p14:creationId xmlns:p14="http://schemas.microsoft.com/office/powerpoint/2010/main" val="1498424887"/>
-      </p:ext>
-    </p:extLst>
   </p:cSld>
   <p:clrMapOvr>
     <a:masterClrMapping/>
@@ -4987,637 +4290,7 @@
     <p:bg>
       <p:bgPr>
         <a:solidFill>
-          <a:schemeClr val="bg1"/>
-        </a:solidFill>
-        <a:effectLst/>
-      </p:bgPr>
-    </p:bg>
-    <p:spTree>
-      <p:nvGrpSpPr>
-        <p:cNvPr id="1" name="">
-          <a:extLst>
-            <a:ext uri="{FF2B5EF4-FFF2-40B4-BE49-F238E27FC236}">
-              <a16:creationId xmlns:a16="http://schemas.microsoft.com/office/drawing/2014/main" id="{D8473CC9-F878-0DD3-37B3-FCFD00CDC70F}"/>
-            </a:ext>
-          </a:extLst>
-        </p:cNvPr>
-        <p:cNvGrpSpPr/>
-        <p:nvPr/>
-      </p:nvGrpSpPr>
-      <p:grpSpPr>
-        <a:xfrm>
-          <a:off x="0" y="0"/>
-          <a:ext cx="0" cy="0"/>
-          <a:chOff x="0" y="0"/>
-          <a:chExt cx="0" cy="0"/>
-        </a:xfrm>
-      </p:grpSpPr>
-      <p:sp>
-        <p:nvSpPr>
-          <p:cNvPr id="20" name="Rectangle 19">
-            <a:extLst>
-              <a:ext uri="{FF2B5EF4-FFF2-40B4-BE49-F238E27FC236}">
-                <a16:creationId xmlns:a16="http://schemas.microsoft.com/office/drawing/2014/main" id="{F3060C83-F051-4F0E-ABAD-AA0DFC48B218}"/>
-              </a:ext>
-              <a:ext uri="{C183D7F6-B498-43B3-948B-1728B52AA6E4}">
-                <adec:decorative xmlns:adec="http://schemas.microsoft.com/office/drawing/2017/decorative" val="1"/>
-              </a:ext>
-            </a:extLst>
-          </p:cNvPr>
-          <p:cNvSpPr>
-            <a:spLocks noGrp="1" noRot="1" noChangeAspect="1" noMove="1" noResize="1" noEditPoints="1" noAdjustHandles="1" noChangeArrowheads="1" noChangeShapeType="1" noTextEdit="1"/>
-          </p:cNvSpPr>
-          <p:nvPr>
-            <p:extLst>
-              <p:ext uri="{386F3935-93C4-4BCD-93E2-E3B085C9AB24}">
-                <p16:designElem xmlns:p16="http://schemas.microsoft.com/office/powerpoint/2015/main" val="1"/>
-              </p:ext>
-            </p:extLst>
-          </p:nvPr>
-        </p:nvSpPr>
-        <p:spPr>
-          <a:xfrm>
-            <a:off x="0" y="0"/>
-            <a:ext cx="18288000" cy="10287000"/>
-          </a:xfrm>
-          <a:prstGeom prst="rect">
-            <a:avLst/>
-          </a:prstGeom>
-          <a:solidFill>
-            <a:schemeClr val="bg1"/>
-          </a:solidFill>
-          <a:ln>
-            <a:noFill/>
-          </a:ln>
-        </p:spPr>
-        <p:style>
-          <a:lnRef idx="2">
-            <a:schemeClr val="accent1">
-              <a:shade val="50000"/>
-            </a:schemeClr>
-          </a:lnRef>
-          <a:fillRef idx="1">
-            <a:schemeClr val="accent1"/>
-          </a:fillRef>
-          <a:effectRef idx="0">
-            <a:schemeClr val="accent1"/>
-          </a:effectRef>
-          <a:fontRef idx="minor">
-            <a:schemeClr val="lt1"/>
-          </a:fontRef>
-        </p:style>
-        <p:txBody>
-          <a:bodyPr rtlCol="0" anchor="ctr"/>
-          <a:lstStyle/>
-          <a:p>
-            <a:pPr algn="ctr"/>
-            <a:endParaRPr lang="en-US" dirty="0"/>
-          </a:p>
-        </p:txBody>
-      </p:sp>
-      <p:sp>
-        <p:nvSpPr>
-          <p:cNvPr id="22" name="Freeform: Shape 21">
-            <a:extLst>
-              <a:ext uri="{FF2B5EF4-FFF2-40B4-BE49-F238E27FC236}">
-                <a16:creationId xmlns:a16="http://schemas.microsoft.com/office/drawing/2014/main" id="{83C98ABE-055B-441F-B07E-44F97F083C39}"/>
-              </a:ext>
-              <a:ext uri="{C183D7F6-B498-43B3-948B-1728B52AA6E4}">
-                <adec:decorative xmlns:adec="http://schemas.microsoft.com/office/drawing/2017/decorative" val="1"/>
-              </a:ext>
-            </a:extLst>
-          </p:cNvPr>
-          <p:cNvSpPr>
-            <a:spLocks noGrp="1" noRot="1" noChangeAspect="1" noMove="1" noResize="1" noEditPoints="1" noAdjustHandles="1" noChangeArrowheads="1" noChangeShapeType="1" noTextEdit="1"/>
-          </p:cNvSpPr>
-          <p:nvPr>
-            <p:extLst>
-              <p:ext uri="{386F3935-93C4-4BCD-93E2-E3B085C9AB24}">
-                <p16:designElem xmlns:p16="http://schemas.microsoft.com/office/powerpoint/2015/main" val="1"/>
-              </p:ext>
-            </p:extLst>
-          </p:nvPr>
-        </p:nvSpPr>
-        <p:spPr>
-          <a:xfrm rot="18900000" flipH="1">
-            <a:off x="-564234" y="-380505"/>
-            <a:ext cx="2741457" cy="2065483"/>
-          </a:xfrm>
-          <a:custGeom>
-            <a:avLst/>
-            <a:gdLst>
-              <a:gd name="connsiteX0" fmla="*/ 0 w 1827638"/>
-              <a:gd name="connsiteY0" fmla="*/ 987379 h 1376989"/>
-              <a:gd name="connsiteX1" fmla="*/ 987379 w 1827638"/>
-              <a:gd name="connsiteY1" fmla="*/ 0 h 1376989"/>
-              <a:gd name="connsiteX2" fmla="*/ 1827638 w 1827638"/>
-              <a:gd name="connsiteY2" fmla="*/ 840260 h 1376989"/>
-              <a:gd name="connsiteX3" fmla="*/ 1827638 w 1827638"/>
-              <a:gd name="connsiteY3" fmla="*/ 1376989 h 1376989"/>
-              <a:gd name="connsiteX4" fmla="*/ 0 w 1827638"/>
-              <a:gd name="connsiteY4" fmla="*/ 1376989 h 1376989"/>
-            </a:gdLst>
-            <a:ahLst/>
-            <a:cxnLst>
-              <a:cxn ang="0">
-                <a:pos x="connsiteX0" y="connsiteY0"/>
-              </a:cxn>
-              <a:cxn ang="0">
-                <a:pos x="connsiteX1" y="connsiteY1"/>
-              </a:cxn>
-              <a:cxn ang="0">
-                <a:pos x="connsiteX2" y="connsiteY2"/>
-              </a:cxn>
-              <a:cxn ang="0">
-                <a:pos x="connsiteX3" y="connsiteY3"/>
-              </a:cxn>
-              <a:cxn ang="0">
-                <a:pos x="connsiteX4" y="connsiteY4"/>
-              </a:cxn>
-            </a:cxnLst>
-            <a:rect l="l" t="t" r="r" b="b"/>
-            <a:pathLst>
-              <a:path w="1827638" h="1376989">
-                <a:moveTo>
-                  <a:pt x="0" y="987379"/>
-                </a:moveTo>
-                <a:lnTo>
-                  <a:pt x="987379" y="0"/>
-                </a:lnTo>
-                <a:lnTo>
-                  <a:pt x="1827638" y="840260"/>
-                </a:lnTo>
-                <a:lnTo>
-                  <a:pt x="1827638" y="1376989"/>
-                </a:lnTo>
-                <a:lnTo>
-                  <a:pt x="0" y="1376989"/>
-                </a:lnTo>
-                <a:close/>
-              </a:path>
-            </a:pathLst>
-          </a:custGeom>
-          <a:solidFill>
-            <a:schemeClr val="accent1">
-              <a:alpha val="30000"/>
-            </a:schemeClr>
-          </a:solidFill>
-          <a:ln>
-            <a:noFill/>
-          </a:ln>
-        </p:spPr>
-        <p:style>
-          <a:lnRef idx="2">
-            <a:schemeClr val="accent1">
-              <a:shade val="50000"/>
-            </a:schemeClr>
-          </a:lnRef>
-          <a:fillRef idx="1">
-            <a:schemeClr val="accent1"/>
-          </a:fillRef>
-          <a:effectRef idx="0">
-            <a:schemeClr val="accent1"/>
-          </a:effectRef>
-          <a:fontRef idx="minor">
-            <a:schemeClr val="lt1"/>
-          </a:fontRef>
-        </p:style>
-        <p:txBody>
-          <a:bodyPr rtlCol="0" anchor="ctr"/>
-          <a:lstStyle/>
-          <a:p>
-            <a:pPr algn="ctr"/>
-            <a:endParaRPr lang="en-US" dirty="0"/>
-          </a:p>
-        </p:txBody>
-      </p:sp>
-      <p:sp>
-        <p:nvSpPr>
-          <p:cNvPr id="24" name="Rectangle 23">
-            <a:extLst>
-              <a:ext uri="{FF2B5EF4-FFF2-40B4-BE49-F238E27FC236}">
-                <a16:creationId xmlns:a16="http://schemas.microsoft.com/office/drawing/2014/main" id="{29FDB030-9B49-4CED-8CCD-4D99382388AC}"/>
-              </a:ext>
-              <a:ext uri="{C183D7F6-B498-43B3-948B-1728B52AA6E4}">
-                <adec:decorative xmlns:adec="http://schemas.microsoft.com/office/drawing/2017/decorative" val="1"/>
-              </a:ext>
-            </a:extLst>
-          </p:cNvPr>
-          <p:cNvSpPr>
-            <a:spLocks noGrp="1" noRot="1" noChangeAspect="1" noMove="1" noResize="1" noEditPoints="1" noAdjustHandles="1" noChangeArrowheads="1" noChangeShapeType="1" noTextEdit="1"/>
-          </p:cNvSpPr>
-          <p:nvPr>
-            <p:extLst>
-              <p:ext uri="{386F3935-93C4-4BCD-93E2-E3B085C9AB24}">
-                <p16:designElem xmlns:p16="http://schemas.microsoft.com/office/powerpoint/2015/main" val="1"/>
-              </p:ext>
-            </p:extLst>
-          </p:nvPr>
-        </p:nvSpPr>
-        <p:spPr>
-          <a:xfrm rot="18900000" flipH="1">
-            <a:off x="1337461" y="633219"/>
-            <a:ext cx="968052" cy="968052"/>
-          </a:xfrm>
-          <a:prstGeom prst="rect">
-            <a:avLst/>
-          </a:prstGeom>
-          <a:solidFill>
-            <a:schemeClr val="accent1">
-              <a:alpha val="30000"/>
-            </a:schemeClr>
-          </a:solidFill>
-          <a:ln>
-            <a:noFill/>
-          </a:ln>
-        </p:spPr>
-        <p:style>
-          <a:lnRef idx="2">
-            <a:schemeClr val="accent1">
-              <a:shade val="50000"/>
-            </a:schemeClr>
-          </a:lnRef>
-          <a:fillRef idx="1">
-            <a:schemeClr val="accent1"/>
-          </a:fillRef>
-          <a:effectRef idx="0">
-            <a:schemeClr val="accent1"/>
-          </a:effectRef>
-          <a:fontRef idx="minor">
-            <a:schemeClr val="lt1"/>
-          </a:fontRef>
-        </p:style>
-        <p:txBody>
-          <a:bodyPr rtlCol="0" anchor="ctr"/>
-          <a:lstStyle/>
-          <a:p>
-            <a:pPr algn="ctr"/>
-            <a:endParaRPr lang="en-US"/>
-          </a:p>
-        </p:txBody>
-      </p:sp>
-      <p:sp>
-        <p:nvSpPr>
-          <p:cNvPr id="26" name="Rectangle 25">
-            <a:extLst>
-              <a:ext uri="{FF2B5EF4-FFF2-40B4-BE49-F238E27FC236}">
-                <a16:creationId xmlns:a16="http://schemas.microsoft.com/office/drawing/2014/main" id="{3783CA14-24A1-485C-8B30-D6A5D87987AD}"/>
-              </a:ext>
-              <a:ext uri="{C183D7F6-B498-43B3-948B-1728B52AA6E4}">
-                <adec:decorative xmlns:adec="http://schemas.microsoft.com/office/drawing/2017/decorative" val="1"/>
-              </a:ext>
-            </a:extLst>
-          </p:cNvPr>
-          <p:cNvSpPr>
-            <a:spLocks noGrp="1" noRot="1" noChangeAspect="1" noMove="1" noResize="1" noEditPoints="1" noAdjustHandles="1" noChangeArrowheads="1" noChangeShapeType="1" noTextEdit="1"/>
-          </p:cNvSpPr>
-          <p:nvPr>
-            <p:extLst>
-              <p:ext uri="{386F3935-93C4-4BCD-93E2-E3B085C9AB24}">
-                <p16:designElem xmlns:p16="http://schemas.microsoft.com/office/powerpoint/2015/main" val="1"/>
-              </p:ext>
-            </p:extLst>
-          </p:nvPr>
-        </p:nvSpPr>
-        <p:spPr>
-          <a:xfrm rot="18900000" flipH="1">
-            <a:off x="15065223" y="982710"/>
-            <a:ext cx="1031208" cy="1031208"/>
-          </a:xfrm>
-          <a:prstGeom prst="rect">
-            <a:avLst/>
-          </a:prstGeom>
-          <a:solidFill>
-            <a:schemeClr val="accent4">
-              <a:alpha val="30000"/>
-            </a:schemeClr>
-          </a:solidFill>
-          <a:ln>
-            <a:noFill/>
-          </a:ln>
-        </p:spPr>
-        <p:style>
-          <a:lnRef idx="2">
-            <a:schemeClr val="accent1">
-              <a:shade val="50000"/>
-            </a:schemeClr>
-          </a:lnRef>
-          <a:fillRef idx="1">
-            <a:schemeClr val="accent1"/>
-          </a:fillRef>
-          <a:effectRef idx="0">
-            <a:schemeClr val="accent1"/>
-          </a:effectRef>
-          <a:fontRef idx="minor">
-            <a:schemeClr val="lt1"/>
-          </a:fontRef>
-        </p:style>
-        <p:txBody>
-          <a:bodyPr rtlCol="0" anchor="ctr"/>
-          <a:lstStyle/>
-          <a:p>
-            <a:pPr algn="ctr"/>
-            <a:endParaRPr lang="en-US"/>
-          </a:p>
-        </p:txBody>
-      </p:sp>
-      <p:sp>
-        <p:nvSpPr>
-          <p:cNvPr id="28" name="Freeform: Shape 27">
-            <a:extLst>
-              <a:ext uri="{FF2B5EF4-FFF2-40B4-BE49-F238E27FC236}">
-                <a16:creationId xmlns:a16="http://schemas.microsoft.com/office/drawing/2014/main" id="{9A97C86A-04D6-40F7-AE84-31AB43E6A846}"/>
-              </a:ext>
-              <a:ext uri="{C183D7F6-B498-43B3-948B-1728B52AA6E4}">
-                <adec:decorative xmlns:adec="http://schemas.microsoft.com/office/drawing/2017/decorative" val="1"/>
-              </a:ext>
-            </a:extLst>
-          </p:cNvPr>
-          <p:cNvSpPr>
-            <a:spLocks noGrp="1" noRot="1" noChangeAspect="1" noMove="1" noResize="1" noEditPoints="1" noAdjustHandles="1" noChangeArrowheads="1" noChangeShapeType="1" noTextEdit="1"/>
-          </p:cNvSpPr>
-          <p:nvPr>
-            <p:extLst>
-              <p:ext uri="{386F3935-93C4-4BCD-93E2-E3B085C9AB24}">
-                <p16:designElem xmlns:p16="http://schemas.microsoft.com/office/powerpoint/2015/main" val="1"/>
-              </p:ext>
-            </p:extLst>
-          </p:nvPr>
-        </p:nvSpPr>
-        <p:spPr>
-          <a:xfrm rot="10800000" flipH="1">
-            <a:off x="14034964" y="0"/>
-            <a:ext cx="4253036" cy="2221255"/>
-          </a:xfrm>
-          <a:custGeom>
-            <a:avLst/>
-            <a:gdLst>
-              <a:gd name="connsiteX0" fmla="*/ 2835357 w 2835357"/>
-              <a:gd name="connsiteY0" fmla="*/ 1480837 h 1480837"/>
-              <a:gd name="connsiteX1" fmla="*/ 0 w 2835357"/>
-              <a:gd name="connsiteY1" fmla="*/ 1480837 h 1480837"/>
-              <a:gd name="connsiteX2" fmla="*/ 1552727 w 2835357"/>
-              <a:gd name="connsiteY2" fmla="*/ 0 h 1480837"/>
-              <a:gd name="connsiteX3" fmla="*/ 2835357 w 2835357"/>
-              <a:gd name="connsiteY3" fmla="*/ 1223245 h 1480837"/>
-            </a:gdLst>
-            <a:ahLst/>
-            <a:cxnLst>
-              <a:cxn ang="0">
-                <a:pos x="connsiteX0" y="connsiteY0"/>
-              </a:cxn>
-              <a:cxn ang="0">
-                <a:pos x="connsiteX1" y="connsiteY1"/>
-              </a:cxn>
-              <a:cxn ang="0">
-                <a:pos x="connsiteX2" y="connsiteY2"/>
-              </a:cxn>
-              <a:cxn ang="0">
-                <a:pos x="connsiteX3" y="connsiteY3"/>
-              </a:cxn>
-            </a:cxnLst>
-            <a:rect l="l" t="t" r="r" b="b"/>
-            <a:pathLst>
-              <a:path w="2835357" h="1480837">
-                <a:moveTo>
-                  <a:pt x="2835357" y="1480837"/>
-                </a:moveTo>
-                <a:lnTo>
-                  <a:pt x="0" y="1480837"/>
-                </a:lnTo>
-                <a:lnTo>
-                  <a:pt x="1552727" y="0"/>
-                </a:lnTo>
-                <a:lnTo>
-                  <a:pt x="2835357" y="1223245"/>
-                </a:lnTo>
-                <a:close/>
-              </a:path>
-            </a:pathLst>
-          </a:custGeom>
-          <a:solidFill>
-            <a:schemeClr val="accent4">
-              <a:alpha val="30000"/>
-            </a:schemeClr>
-          </a:solidFill>
-          <a:ln>
-            <a:noFill/>
-          </a:ln>
-        </p:spPr>
-        <p:style>
-          <a:lnRef idx="2">
-            <a:schemeClr val="accent1">
-              <a:shade val="50000"/>
-            </a:schemeClr>
-          </a:lnRef>
-          <a:fillRef idx="1">
-            <a:schemeClr val="accent1"/>
-          </a:fillRef>
-          <a:effectRef idx="0">
-            <a:schemeClr val="accent1"/>
-          </a:effectRef>
-          <a:fontRef idx="minor">
-            <a:schemeClr val="lt1"/>
-          </a:fontRef>
-        </p:style>
-        <p:txBody>
-          <a:bodyPr wrap="square" rtlCol="0" anchor="ctr">
-            <a:noAutofit/>
-          </a:bodyPr>
-          <a:lstStyle/>
-          <a:p>
-            <a:pPr algn="ctr"/>
-            <a:endParaRPr lang="en-US" dirty="0"/>
-          </a:p>
-        </p:txBody>
-      </p:sp>
-      <p:sp>
-        <p:nvSpPr>
-          <p:cNvPr id="30" name="Isosceles Triangle 29">
-            <a:extLst>
-              <a:ext uri="{FF2B5EF4-FFF2-40B4-BE49-F238E27FC236}">
-                <a16:creationId xmlns:a16="http://schemas.microsoft.com/office/drawing/2014/main" id="{FF9F2414-84E8-453E-B1F3-389FDE8192D9}"/>
-              </a:ext>
-              <a:ext uri="{C183D7F6-B498-43B3-948B-1728B52AA6E4}">
-                <adec:decorative xmlns:adec="http://schemas.microsoft.com/office/drawing/2017/decorative" val="1"/>
-              </a:ext>
-            </a:extLst>
-          </p:cNvPr>
-          <p:cNvSpPr>
-            <a:spLocks noGrp="1" noRot="1" noChangeAspect="1" noMove="1" noResize="1" noEditPoints="1" noAdjustHandles="1" noChangeArrowheads="1" noChangeShapeType="1" noTextEdit="1"/>
-          </p:cNvSpPr>
-          <p:nvPr>
-            <p:extLst>
-              <p:ext uri="{386F3935-93C4-4BCD-93E2-E3B085C9AB24}">
-                <p16:designElem xmlns:p16="http://schemas.microsoft.com/office/powerpoint/2015/main" val="1"/>
-              </p:ext>
-            </p:extLst>
-          </p:nvPr>
-        </p:nvSpPr>
-        <p:spPr>
-          <a:xfrm flipH="1">
-            <a:off x="11964516" y="9173251"/>
-            <a:ext cx="2241769" cy="1113749"/>
-          </a:xfrm>
-          <a:prstGeom prst="triangle">
-            <a:avLst/>
-          </a:prstGeom>
-          <a:solidFill>
-            <a:schemeClr val="accent1">
-              <a:alpha val="30000"/>
-            </a:schemeClr>
-          </a:solidFill>
-          <a:ln>
-            <a:noFill/>
-          </a:ln>
-        </p:spPr>
-        <p:style>
-          <a:lnRef idx="2">
-            <a:schemeClr val="accent1">
-              <a:shade val="50000"/>
-            </a:schemeClr>
-          </a:lnRef>
-          <a:fillRef idx="1">
-            <a:schemeClr val="accent1"/>
-          </a:fillRef>
-          <a:effectRef idx="0">
-            <a:schemeClr val="accent1"/>
-          </a:effectRef>
-          <a:fontRef idx="minor">
-            <a:schemeClr val="lt1"/>
-          </a:fontRef>
-        </p:style>
-        <p:txBody>
-          <a:bodyPr rtlCol="0" anchor="ctr"/>
-          <a:lstStyle/>
-          <a:p>
-            <a:pPr algn="ctr"/>
-            <a:endParaRPr lang="en-US"/>
-          </a:p>
-        </p:txBody>
-      </p:sp>
-      <p:pic>
-        <p:nvPicPr>
-          <p:cNvPr id="15" name="Picture 14">
-            <a:extLst>
-              <a:ext uri="{FF2B5EF4-FFF2-40B4-BE49-F238E27FC236}">
-                <a16:creationId xmlns:a16="http://schemas.microsoft.com/office/drawing/2014/main" id="{11287239-288B-A231-101B-D1A647B47DF8}"/>
-              </a:ext>
-            </a:extLst>
-          </p:cNvPr>
-          <p:cNvPicPr>
-            <a:picLocks noChangeAspect="1"/>
-          </p:cNvPicPr>
-          <p:nvPr/>
-        </p:nvPicPr>
-        <p:blipFill>
-          <a:blip r:embed="rId2">
-            <a:extLst>
-              <a:ext uri="{28A0092B-C50C-407E-A947-70E740481C1C}">
-                <a14:useLocalDpi xmlns:a14="http://schemas.microsoft.com/office/drawing/2010/main" val="0"/>
-              </a:ext>
-            </a:extLst>
-          </a:blip>
-          <a:stretch/>
-        </p:blipFill>
-        <p:spPr>
-          <a:xfrm>
-            <a:off x="152402" y="647700"/>
-            <a:ext cx="18064027" cy="9032013"/>
-          </a:xfrm>
-          <a:prstGeom prst="rect">
-            <a:avLst/>
-          </a:prstGeom>
-          <a:ln>
-            <a:noFill/>
-          </a:ln>
-        </p:spPr>
-      </p:pic>
-      <p:sp>
-        <p:nvSpPr>
-          <p:cNvPr id="32" name="Isosceles Triangle 31">
-            <a:extLst>
-              <a:ext uri="{FF2B5EF4-FFF2-40B4-BE49-F238E27FC236}">
-                <a16:creationId xmlns:a16="http://schemas.microsoft.com/office/drawing/2014/main" id="{3ECA69A1-7536-43AC-85EF-C7106179F5ED}"/>
-              </a:ext>
-              <a:ext uri="{C183D7F6-B498-43B3-948B-1728B52AA6E4}">
-                <adec:decorative xmlns:adec="http://schemas.microsoft.com/office/drawing/2017/decorative" val="1"/>
-              </a:ext>
-            </a:extLst>
-          </p:cNvPr>
-          <p:cNvSpPr>
-            <a:spLocks noGrp="1" noRot="1" noChangeAspect="1" noMove="1" noResize="1" noEditPoints="1" noAdjustHandles="1" noChangeArrowheads="1" noChangeShapeType="1" noTextEdit="1"/>
-          </p:cNvSpPr>
-          <p:nvPr>
-            <p:extLst>
-              <p:ext uri="{386F3935-93C4-4BCD-93E2-E3B085C9AB24}">
-                <p16:designElem xmlns:p16="http://schemas.microsoft.com/office/powerpoint/2015/main" val="1"/>
-              </p:ext>
-            </p:extLst>
-          </p:nvPr>
-        </p:nvSpPr>
-        <p:spPr>
-          <a:xfrm flipH="1">
-            <a:off x="11406120" y="9679714"/>
-            <a:ext cx="1222354" cy="607286"/>
-          </a:xfrm>
-          <a:prstGeom prst="triangle">
-            <a:avLst/>
-          </a:prstGeom>
-          <a:solidFill>
-            <a:schemeClr val="accent1">
-              <a:alpha val="30000"/>
-            </a:schemeClr>
-          </a:solidFill>
-          <a:ln>
-            <a:noFill/>
-          </a:ln>
-        </p:spPr>
-        <p:style>
-          <a:lnRef idx="2">
-            <a:schemeClr val="accent1">
-              <a:shade val="50000"/>
-            </a:schemeClr>
-          </a:lnRef>
-          <a:fillRef idx="1">
-            <a:schemeClr val="accent1"/>
-          </a:fillRef>
-          <a:effectRef idx="0">
-            <a:schemeClr val="accent1"/>
-          </a:effectRef>
-          <a:fontRef idx="minor">
-            <a:schemeClr val="lt1"/>
-          </a:fontRef>
-        </p:style>
-        <p:txBody>
-          <a:bodyPr rtlCol="0" anchor="ctr"/>
-          <a:lstStyle/>
-          <a:p>
-            <a:pPr algn="ctr"/>
-            <a:endParaRPr lang="en-US"/>
-          </a:p>
-        </p:txBody>
-      </p:sp>
-    </p:spTree>
-    <p:extLst>
-      <p:ext uri="{BB962C8B-B14F-4D97-AF65-F5344CB8AC3E}">
-        <p14:creationId xmlns:p14="http://schemas.microsoft.com/office/powerpoint/2010/main" val="389996601"/>
-      </p:ext>
-    </p:extLst>
-  </p:cSld>
-  <p:clrMapOvr>
-    <a:masterClrMapping/>
-  </p:clrMapOvr>
-</p:sld>
-</file>
-
-<file path=ppt/slides/slide5.xml><?xml version="1.0" encoding="utf-8"?>
-<p:sld xmlns:a="http://schemas.openxmlformats.org/drawingml/2006/main" xmlns:r="http://schemas.openxmlformats.org/officeDocument/2006/relationships" xmlns:p="http://schemas.openxmlformats.org/presentationml/2006/main">
-  <p:cSld>
-    <p:bg>
-      <p:bgPr>
-        <a:solidFill>
-          <a:schemeClr val="bg1"/>
+          <a:srgbClr val="F8EFE5"/>
         </a:solidFill>
         <a:effectLst/>
       </p:bgPr>
@@ -5642,490 +4315,6 @@
           <a:chExt cx="0" cy="0"/>
         </a:xfrm>
       </p:grpSpPr>
-      <p:sp>
-        <p:nvSpPr>
-          <p:cNvPr id="20" name="Rectangle 19">
-            <a:extLst>
-              <a:ext uri="{FF2B5EF4-FFF2-40B4-BE49-F238E27FC236}">
-                <a16:creationId xmlns:a16="http://schemas.microsoft.com/office/drawing/2014/main" id="{F3060C83-F051-4F0E-ABAD-AA0DFC48B218}"/>
-              </a:ext>
-              <a:ext uri="{C183D7F6-B498-43B3-948B-1728B52AA6E4}">
-                <adec:decorative xmlns:adec="http://schemas.microsoft.com/office/drawing/2017/decorative" val="1"/>
-              </a:ext>
-            </a:extLst>
-          </p:cNvPr>
-          <p:cNvSpPr>
-            <a:spLocks noGrp="1" noRot="1" noChangeAspect="1" noMove="1" noResize="1" noEditPoints="1" noAdjustHandles="1" noChangeArrowheads="1" noChangeShapeType="1" noTextEdit="1"/>
-          </p:cNvSpPr>
-          <p:nvPr>
-            <p:extLst>
-              <p:ext uri="{386F3935-93C4-4BCD-93E2-E3B085C9AB24}">
-                <p16:designElem xmlns:p16="http://schemas.microsoft.com/office/powerpoint/2015/main" val="1"/>
-              </p:ext>
-            </p:extLst>
-          </p:nvPr>
-        </p:nvSpPr>
-        <p:spPr>
-          <a:xfrm>
-            <a:off x="0" y="0"/>
-            <a:ext cx="18288000" cy="10287000"/>
-          </a:xfrm>
-          <a:prstGeom prst="rect">
-            <a:avLst/>
-          </a:prstGeom>
-          <a:solidFill>
-            <a:schemeClr val="bg1"/>
-          </a:solidFill>
-          <a:ln>
-            <a:noFill/>
-          </a:ln>
-        </p:spPr>
-        <p:style>
-          <a:lnRef idx="2">
-            <a:schemeClr val="accent1">
-              <a:shade val="50000"/>
-            </a:schemeClr>
-          </a:lnRef>
-          <a:fillRef idx="1">
-            <a:schemeClr val="accent1"/>
-          </a:fillRef>
-          <a:effectRef idx="0">
-            <a:schemeClr val="accent1"/>
-          </a:effectRef>
-          <a:fontRef idx="minor">
-            <a:schemeClr val="lt1"/>
-          </a:fontRef>
-        </p:style>
-        <p:txBody>
-          <a:bodyPr rtlCol="0" anchor="ctr"/>
-          <a:lstStyle/>
-          <a:p>
-            <a:pPr algn="ctr"/>
-            <a:endParaRPr lang="en-US" dirty="0"/>
-          </a:p>
-        </p:txBody>
-      </p:sp>
-      <p:sp>
-        <p:nvSpPr>
-          <p:cNvPr id="22" name="Freeform: Shape 21">
-            <a:extLst>
-              <a:ext uri="{FF2B5EF4-FFF2-40B4-BE49-F238E27FC236}">
-                <a16:creationId xmlns:a16="http://schemas.microsoft.com/office/drawing/2014/main" id="{83C98ABE-055B-441F-B07E-44F97F083C39}"/>
-              </a:ext>
-              <a:ext uri="{C183D7F6-B498-43B3-948B-1728B52AA6E4}">
-                <adec:decorative xmlns:adec="http://schemas.microsoft.com/office/drawing/2017/decorative" val="1"/>
-              </a:ext>
-            </a:extLst>
-          </p:cNvPr>
-          <p:cNvSpPr>
-            <a:spLocks noGrp="1" noRot="1" noChangeAspect="1" noMove="1" noResize="1" noEditPoints="1" noAdjustHandles="1" noChangeArrowheads="1" noChangeShapeType="1" noTextEdit="1"/>
-          </p:cNvSpPr>
-          <p:nvPr>
-            <p:extLst>
-              <p:ext uri="{386F3935-93C4-4BCD-93E2-E3B085C9AB24}">
-                <p16:designElem xmlns:p16="http://schemas.microsoft.com/office/powerpoint/2015/main" val="1"/>
-              </p:ext>
-            </p:extLst>
-          </p:nvPr>
-        </p:nvSpPr>
-        <p:spPr>
-          <a:xfrm rot="18900000" flipH="1">
-            <a:off x="-564234" y="-380505"/>
-            <a:ext cx="2741457" cy="2065483"/>
-          </a:xfrm>
-          <a:custGeom>
-            <a:avLst/>
-            <a:gdLst>
-              <a:gd name="connsiteX0" fmla="*/ 0 w 1827638"/>
-              <a:gd name="connsiteY0" fmla="*/ 987379 h 1376989"/>
-              <a:gd name="connsiteX1" fmla="*/ 987379 w 1827638"/>
-              <a:gd name="connsiteY1" fmla="*/ 0 h 1376989"/>
-              <a:gd name="connsiteX2" fmla="*/ 1827638 w 1827638"/>
-              <a:gd name="connsiteY2" fmla="*/ 840260 h 1376989"/>
-              <a:gd name="connsiteX3" fmla="*/ 1827638 w 1827638"/>
-              <a:gd name="connsiteY3" fmla="*/ 1376989 h 1376989"/>
-              <a:gd name="connsiteX4" fmla="*/ 0 w 1827638"/>
-              <a:gd name="connsiteY4" fmla="*/ 1376989 h 1376989"/>
-            </a:gdLst>
-            <a:ahLst/>
-            <a:cxnLst>
-              <a:cxn ang="0">
-                <a:pos x="connsiteX0" y="connsiteY0"/>
-              </a:cxn>
-              <a:cxn ang="0">
-                <a:pos x="connsiteX1" y="connsiteY1"/>
-              </a:cxn>
-              <a:cxn ang="0">
-                <a:pos x="connsiteX2" y="connsiteY2"/>
-              </a:cxn>
-              <a:cxn ang="0">
-                <a:pos x="connsiteX3" y="connsiteY3"/>
-              </a:cxn>
-              <a:cxn ang="0">
-                <a:pos x="connsiteX4" y="connsiteY4"/>
-              </a:cxn>
-            </a:cxnLst>
-            <a:rect l="l" t="t" r="r" b="b"/>
-            <a:pathLst>
-              <a:path w="1827638" h="1376989">
-                <a:moveTo>
-                  <a:pt x="0" y="987379"/>
-                </a:moveTo>
-                <a:lnTo>
-                  <a:pt x="987379" y="0"/>
-                </a:lnTo>
-                <a:lnTo>
-                  <a:pt x="1827638" y="840260"/>
-                </a:lnTo>
-                <a:lnTo>
-                  <a:pt x="1827638" y="1376989"/>
-                </a:lnTo>
-                <a:lnTo>
-                  <a:pt x="0" y="1376989"/>
-                </a:lnTo>
-                <a:close/>
-              </a:path>
-            </a:pathLst>
-          </a:custGeom>
-          <a:solidFill>
-            <a:schemeClr val="accent1">
-              <a:alpha val="30000"/>
-            </a:schemeClr>
-          </a:solidFill>
-          <a:ln>
-            <a:noFill/>
-          </a:ln>
-        </p:spPr>
-        <p:style>
-          <a:lnRef idx="2">
-            <a:schemeClr val="accent1">
-              <a:shade val="50000"/>
-            </a:schemeClr>
-          </a:lnRef>
-          <a:fillRef idx="1">
-            <a:schemeClr val="accent1"/>
-          </a:fillRef>
-          <a:effectRef idx="0">
-            <a:schemeClr val="accent1"/>
-          </a:effectRef>
-          <a:fontRef idx="minor">
-            <a:schemeClr val="lt1"/>
-          </a:fontRef>
-        </p:style>
-        <p:txBody>
-          <a:bodyPr rtlCol="0" anchor="ctr"/>
-          <a:lstStyle/>
-          <a:p>
-            <a:pPr algn="ctr"/>
-            <a:endParaRPr lang="en-US" dirty="0"/>
-          </a:p>
-        </p:txBody>
-      </p:sp>
-      <p:sp>
-        <p:nvSpPr>
-          <p:cNvPr id="24" name="Rectangle 23">
-            <a:extLst>
-              <a:ext uri="{FF2B5EF4-FFF2-40B4-BE49-F238E27FC236}">
-                <a16:creationId xmlns:a16="http://schemas.microsoft.com/office/drawing/2014/main" id="{29FDB030-9B49-4CED-8CCD-4D99382388AC}"/>
-              </a:ext>
-              <a:ext uri="{C183D7F6-B498-43B3-948B-1728B52AA6E4}">
-                <adec:decorative xmlns:adec="http://schemas.microsoft.com/office/drawing/2017/decorative" val="1"/>
-              </a:ext>
-            </a:extLst>
-          </p:cNvPr>
-          <p:cNvSpPr>
-            <a:spLocks noGrp="1" noRot="1" noChangeAspect="1" noMove="1" noResize="1" noEditPoints="1" noAdjustHandles="1" noChangeArrowheads="1" noChangeShapeType="1" noTextEdit="1"/>
-          </p:cNvSpPr>
-          <p:nvPr>
-            <p:extLst>
-              <p:ext uri="{386F3935-93C4-4BCD-93E2-E3B085C9AB24}">
-                <p16:designElem xmlns:p16="http://schemas.microsoft.com/office/powerpoint/2015/main" val="1"/>
-              </p:ext>
-            </p:extLst>
-          </p:nvPr>
-        </p:nvSpPr>
-        <p:spPr>
-          <a:xfrm rot="18900000" flipH="1">
-            <a:off x="1337461" y="633219"/>
-            <a:ext cx="968052" cy="968052"/>
-          </a:xfrm>
-          <a:prstGeom prst="rect">
-            <a:avLst/>
-          </a:prstGeom>
-          <a:solidFill>
-            <a:schemeClr val="accent1">
-              <a:alpha val="30000"/>
-            </a:schemeClr>
-          </a:solidFill>
-          <a:ln>
-            <a:noFill/>
-          </a:ln>
-        </p:spPr>
-        <p:style>
-          <a:lnRef idx="2">
-            <a:schemeClr val="accent1">
-              <a:shade val="50000"/>
-            </a:schemeClr>
-          </a:lnRef>
-          <a:fillRef idx="1">
-            <a:schemeClr val="accent1"/>
-          </a:fillRef>
-          <a:effectRef idx="0">
-            <a:schemeClr val="accent1"/>
-          </a:effectRef>
-          <a:fontRef idx="minor">
-            <a:schemeClr val="lt1"/>
-          </a:fontRef>
-        </p:style>
-        <p:txBody>
-          <a:bodyPr rtlCol="0" anchor="ctr"/>
-          <a:lstStyle/>
-          <a:p>
-            <a:pPr algn="ctr"/>
-            <a:endParaRPr lang="en-US"/>
-          </a:p>
-        </p:txBody>
-      </p:sp>
-      <p:sp>
-        <p:nvSpPr>
-          <p:cNvPr id="26" name="Rectangle 25">
-            <a:extLst>
-              <a:ext uri="{FF2B5EF4-FFF2-40B4-BE49-F238E27FC236}">
-                <a16:creationId xmlns:a16="http://schemas.microsoft.com/office/drawing/2014/main" id="{3783CA14-24A1-485C-8B30-D6A5D87987AD}"/>
-              </a:ext>
-              <a:ext uri="{C183D7F6-B498-43B3-948B-1728B52AA6E4}">
-                <adec:decorative xmlns:adec="http://schemas.microsoft.com/office/drawing/2017/decorative" val="1"/>
-              </a:ext>
-            </a:extLst>
-          </p:cNvPr>
-          <p:cNvSpPr>
-            <a:spLocks noGrp="1" noRot="1" noChangeAspect="1" noMove="1" noResize="1" noEditPoints="1" noAdjustHandles="1" noChangeArrowheads="1" noChangeShapeType="1" noTextEdit="1"/>
-          </p:cNvSpPr>
-          <p:nvPr>
-            <p:extLst>
-              <p:ext uri="{386F3935-93C4-4BCD-93E2-E3B085C9AB24}">
-                <p16:designElem xmlns:p16="http://schemas.microsoft.com/office/powerpoint/2015/main" val="1"/>
-              </p:ext>
-            </p:extLst>
-          </p:nvPr>
-        </p:nvSpPr>
-        <p:spPr>
-          <a:xfrm rot="18900000" flipH="1">
-            <a:off x="15065223" y="982710"/>
-            <a:ext cx="1031208" cy="1031208"/>
-          </a:xfrm>
-          <a:prstGeom prst="rect">
-            <a:avLst/>
-          </a:prstGeom>
-          <a:solidFill>
-            <a:schemeClr val="accent4">
-              <a:alpha val="30000"/>
-            </a:schemeClr>
-          </a:solidFill>
-          <a:ln>
-            <a:noFill/>
-          </a:ln>
-        </p:spPr>
-        <p:style>
-          <a:lnRef idx="2">
-            <a:schemeClr val="accent1">
-              <a:shade val="50000"/>
-            </a:schemeClr>
-          </a:lnRef>
-          <a:fillRef idx="1">
-            <a:schemeClr val="accent1"/>
-          </a:fillRef>
-          <a:effectRef idx="0">
-            <a:schemeClr val="accent1"/>
-          </a:effectRef>
-          <a:fontRef idx="minor">
-            <a:schemeClr val="lt1"/>
-          </a:fontRef>
-        </p:style>
-        <p:txBody>
-          <a:bodyPr rtlCol="0" anchor="ctr"/>
-          <a:lstStyle/>
-          <a:p>
-            <a:pPr algn="ctr"/>
-            <a:endParaRPr lang="en-US"/>
-          </a:p>
-        </p:txBody>
-      </p:sp>
-      <p:sp>
-        <p:nvSpPr>
-          <p:cNvPr id="28" name="Freeform: Shape 27">
-            <a:extLst>
-              <a:ext uri="{FF2B5EF4-FFF2-40B4-BE49-F238E27FC236}">
-                <a16:creationId xmlns:a16="http://schemas.microsoft.com/office/drawing/2014/main" id="{9A97C86A-04D6-40F7-AE84-31AB43E6A846}"/>
-              </a:ext>
-              <a:ext uri="{C183D7F6-B498-43B3-948B-1728B52AA6E4}">
-                <adec:decorative xmlns:adec="http://schemas.microsoft.com/office/drawing/2017/decorative" val="1"/>
-              </a:ext>
-            </a:extLst>
-          </p:cNvPr>
-          <p:cNvSpPr>
-            <a:spLocks noGrp="1" noRot="1" noChangeAspect="1" noMove="1" noResize="1" noEditPoints="1" noAdjustHandles="1" noChangeArrowheads="1" noChangeShapeType="1" noTextEdit="1"/>
-          </p:cNvSpPr>
-          <p:nvPr>
-            <p:extLst>
-              <p:ext uri="{386F3935-93C4-4BCD-93E2-E3B085C9AB24}">
-                <p16:designElem xmlns:p16="http://schemas.microsoft.com/office/powerpoint/2015/main" val="1"/>
-              </p:ext>
-            </p:extLst>
-          </p:nvPr>
-        </p:nvSpPr>
-        <p:spPr>
-          <a:xfrm rot="10800000" flipH="1">
-            <a:off x="14034964" y="0"/>
-            <a:ext cx="4253036" cy="2221255"/>
-          </a:xfrm>
-          <a:custGeom>
-            <a:avLst/>
-            <a:gdLst>
-              <a:gd name="connsiteX0" fmla="*/ 2835357 w 2835357"/>
-              <a:gd name="connsiteY0" fmla="*/ 1480837 h 1480837"/>
-              <a:gd name="connsiteX1" fmla="*/ 0 w 2835357"/>
-              <a:gd name="connsiteY1" fmla="*/ 1480837 h 1480837"/>
-              <a:gd name="connsiteX2" fmla="*/ 1552727 w 2835357"/>
-              <a:gd name="connsiteY2" fmla="*/ 0 h 1480837"/>
-              <a:gd name="connsiteX3" fmla="*/ 2835357 w 2835357"/>
-              <a:gd name="connsiteY3" fmla="*/ 1223245 h 1480837"/>
-            </a:gdLst>
-            <a:ahLst/>
-            <a:cxnLst>
-              <a:cxn ang="0">
-                <a:pos x="connsiteX0" y="connsiteY0"/>
-              </a:cxn>
-              <a:cxn ang="0">
-                <a:pos x="connsiteX1" y="connsiteY1"/>
-              </a:cxn>
-              <a:cxn ang="0">
-                <a:pos x="connsiteX2" y="connsiteY2"/>
-              </a:cxn>
-              <a:cxn ang="0">
-                <a:pos x="connsiteX3" y="connsiteY3"/>
-              </a:cxn>
-            </a:cxnLst>
-            <a:rect l="l" t="t" r="r" b="b"/>
-            <a:pathLst>
-              <a:path w="2835357" h="1480837">
-                <a:moveTo>
-                  <a:pt x="2835357" y="1480837"/>
-                </a:moveTo>
-                <a:lnTo>
-                  <a:pt x="0" y="1480837"/>
-                </a:lnTo>
-                <a:lnTo>
-                  <a:pt x="1552727" y="0"/>
-                </a:lnTo>
-                <a:lnTo>
-                  <a:pt x="2835357" y="1223245"/>
-                </a:lnTo>
-                <a:close/>
-              </a:path>
-            </a:pathLst>
-          </a:custGeom>
-          <a:solidFill>
-            <a:schemeClr val="accent4">
-              <a:alpha val="30000"/>
-            </a:schemeClr>
-          </a:solidFill>
-          <a:ln>
-            <a:noFill/>
-          </a:ln>
-        </p:spPr>
-        <p:style>
-          <a:lnRef idx="2">
-            <a:schemeClr val="accent1">
-              <a:shade val="50000"/>
-            </a:schemeClr>
-          </a:lnRef>
-          <a:fillRef idx="1">
-            <a:schemeClr val="accent1"/>
-          </a:fillRef>
-          <a:effectRef idx="0">
-            <a:schemeClr val="accent1"/>
-          </a:effectRef>
-          <a:fontRef idx="minor">
-            <a:schemeClr val="lt1"/>
-          </a:fontRef>
-        </p:style>
-        <p:txBody>
-          <a:bodyPr wrap="square" rtlCol="0" anchor="ctr">
-            <a:noAutofit/>
-          </a:bodyPr>
-          <a:lstStyle/>
-          <a:p>
-            <a:pPr algn="ctr"/>
-            <a:endParaRPr lang="en-US" dirty="0"/>
-          </a:p>
-        </p:txBody>
-      </p:sp>
-      <p:sp>
-        <p:nvSpPr>
-          <p:cNvPr id="30" name="Isosceles Triangle 29">
-            <a:extLst>
-              <a:ext uri="{FF2B5EF4-FFF2-40B4-BE49-F238E27FC236}">
-                <a16:creationId xmlns:a16="http://schemas.microsoft.com/office/drawing/2014/main" id="{FF9F2414-84E8-453E-B1F3-389FDE8192D9}"/>
-              </a:ext>
-              <a:ext uri="{C183D7F6-B498-43B3-948B-1728B52AA6E4}">
-                <adec:decorative xmlns:adec="http://schemas.microsoft.com/office/drawing/2017/decorative" val="1"/>
-              </a:ext>
-            </a:extLst>
-          </p:cNvPr>
-          <p:cNvSpPr>
-            <a:spLocks noGrp="1" noRot="1" noChangeAspect="1" noMove="1" noResize="1" noEditPoints="1" noAdjustHandles="1" noChangeArrowheads="1" noChangeShapeType="1" noTextEdit="1"/>
-          </p:cNvSpPr>
-          <p:nvPr>
-            <p:extLst>
-              <p:ext uri="{386F3935-93C4-4BCD-93E2-E3B085C9AB24}">
-                <p16:designElem xmlns:p16="http://schemas.microsoft.com/office/powerpoint/2015/main" val="1"/>
-              </p:ext>
-            </p:extLst>
-          </p:nvPr>
-        </p:nvSpPr>
-        <p:spPr>
-          <a:xfrm flipH="1">
-            <a:off x="11964516" y="9173251"/>
-            <a:ext cx="2241769" cy="1113749"/>
-          </a:xfrm>
-          <a:prstGeom prst="triangle">
-            <a:avLst/>
-          </a:prstGeom>
-          <a:solidFill>
-            <a:schemeClr val="accent1">
-              <a:alpha val="30000"/>
-            </a:schemeClr>
-          </a:solidFill>
-          <a:ln>
-            <a:noFill/>
-          </a:ln>
-        </p:spPr>
-        <p:style>
-          <a:lnRef idx="2">
-            <a:schemeClr val="accent1">
-              <a:shade val="50000"/>
-            </a:schemeClr>
-          </a:lnRef>
-          <a:fillRef idx="1">
-            <a:schemeClr val="accent1"/>
-          </a:fillRef>
-          <a:effectRef idx="0">
-            <a:schemeClr val="accent1"/>
-          </a:effectRef>
-          <a:fontRef idx="minor">
-            <a:schemeClr val="lt1"/>
-          </a:fontRef>
-        </p:style>
-        <p:txBody>
-          <a:bodyPr rtlCol="0" anchor="ctr"/>
-          <a:lstStyle/>
-          <a:p>
-            <a:pPr algn="ctr"/>
-            <a:endParaRPr lang="en-US"/>
-          </a:p>
-        </p:txBody>
-      </p:sp>
       <p:pic>
         <p:nvPicPr>
           <p:cNvPr id="15" name="Picture 14" descr="A graph of green rectangular bars&#10;&#10;AI-generated content may be incorrect.">
@@ -6154,82 +4343,14 @@
         </p:blipFill>
         <p:spPr>
           <a:xfrm>
-            <a:off x="3124200" y="-16328"/>
-            <a:ext cx="11887199" cy="10303328"/>
+            <a:off x="3352800" y="571500"/>
+            <a:ext cx="10953750" cy="9388929"/>
           </a:xfrm>
           <a:prstGeom prst="rect">
             <a:avLst/>
           </a:prstGeom>
-          <a:ln>
-            <a:noFill/>
-          </a:ln>
         </p:spPr>
       </p:pic>
-      <p:sp>
-        <p:nvSpPr>
-          <p:cNvPr id="32" name="Isosceles Triangle 31">
-            <a:extLst>
-              <a:ext uri="{FF2B5EF4-FFF2-40B4-BE49-F238E27FC236}">
-                <a16:creationId xmlns:a16="http://schemas.microsoft.com/office/drawing/2014/main" id="{3ECA69A1-7536-43AC-85EF-C7106179F5ED}"/>
-              </a:ext>
-              <a:ext uri="{C183D7F6-B498-43B3-948B-1728B52AA6E4}">
-                <adec:decorative xmlns:adec="http://schemas.microsoft.com/office/drawing/2017/decorative" val="1"/>
-              </a:ext>
-            </a:extLst>
-          </p:cNvPr>
-          <p:cNvSpPr>
-            <a:spLocks noGrp="1" noRot="1" noChangeAspect="1" noMove="1" noResize="1" noEditPoints="1" noAdjustHandles="1" noChangeArrowheads="1" noChangeShapeType="1" noTextEdit="1"/>
-          </p:cNvSpPr>
-          <p:nvPr>
-            <p:extLst>
-              <p:ext uri="{386F3935-93C4-4BCD-93E2-E3B085C9AB24}">
-                <p16:designElem xmlns:p16="http://schemas.microsoft.com/office/powerpoint/2015/main" val="1"/>
-              </p:ext>
-            </p:extLst>
-          </p:nvPr>
-        </p:nvSpPr>
-        <p:spPr>
-          <a:xfrm flipH="1">
-            <a:off x="11406120" y="9679714"/>
-            <a:ext cx="1222354" cy="607286"/>
-          </a:xfrm>
-          <a:prstGeom prst="triangle">
-            <a:avLst/>
-          </a:prstGeom>
-          <a:solidFill>
-            <a:schemeClr val="accent1">
-              <a:alpha val="30000"/>
-            </a:schemeClr>
-          </a:solidFill>
-          <a:ln>
-            <a:noFill/>
-          </a:ln>
-        </p:spPr>
-        <p:style>
-          <a:lnRef idx="2">
-            <a:schemeClr val="accent1">
-              <a:shade val="50000"/>
-            </a:schemeClr>
-          </a:lnRef>
-          <a:fillRef idx="1">
-            <a:schemeClr val="accent1"/>
-          </a:fillRef>
-          <a:effectRef idx="0">
-            <a:schemeClr val="accent1"/>
-          </a:effectRef>
-          <a:fontRef idx="minor">
-            <a:schemeClr val="lt1"/>
-          </a:fontRef>
-        </p:style>
-        <p:txBody>
-          <a:bodyPr rtlCol="0" anchor="ctr"/>
-          <a:lstStyle/>
-          <a:p>
-            <a:pPr algn="ctr"/>
-            <a:endParaRPr lang="en-US"/>
-          </a:p>
-        </p:txBody>
-      </p:sp>
     </p:spTree>
     <p:extLst>
       <p:ext uri="{BB962C8B-B14F-4D97-AF65-F5344CB8AC3E}">
@@ -6243,13 +4364,13 @@
 </p:sld>
 </file>
 
-<file path=ppt/slides/slide6.xml><?xml version="1.0" encoding="utf-8"?>
+<file path=ppt/slides/slide5.xml><?xml version="1.0" encoding="utf-8"?>
 <p:sld xmlns:a="http://schemas.openxmlformats.org/drawingml/2006/main" xmlns:r="http://schemas.openxmlformats.org/officeDocument/2006/relationships" xmlns:p="http://schemas.openxmlformats.org/presentationml/2006/main">
   <p:cSld>
     <p:bg>
       <p:bgPr>
         <a:solidFill>
-          <a:schemeClr val="bg1"/>
+          <a:srgbClr val="F8EFE5"/>
         </a:solidFill>
         <a:effectLst/>
       </p:bgPr>
@@ -6274,493 +4395,9 @@
           <a:chExt cx="0" cy="0"/>
         </a:xfrm>
       </p:grpSpPr>
-      <p:sp>
-        <p:nvSpPr>
-          <p:cNvPr id="8" name="Rectangle 7">
-            <a:extLst>
-              <a:ext uri="{FF2B5EF4-FFF2-40B4-BE49-F238E27FC236}">
-                <a16:creationId xmlns:a16="http://schemas.microsoft.com/office/drawing/2014/main" id="{F3060C83-F051-4F0E-ABAD-AA0DFC48B218}"/>
-              </a:ext>
-              <a:ext uri="{C183D7F6-B498-43B3-948B-1728B52AA6E4}">
-                <adec:decorative xmlns:adec="http://schemas.microsoft.com/office/drawing/2017/decorative" val="1"/>
-              </a:ext>
-            </a:extLst>
-          </p:cNvPr>
-          <p:cNvSpPr>
-            <a:spLocks noGrp="1" noRot="1" noChangeAspect="1" noMove="1" noResize="1" noEditPoints="1" noAdjustHandles="1" noChangeArrowheads="1" noChangeShapeType="1" noTextEdit="1"/>
-          </p:cNvSpPr>
-          <p:nvPr>
-            <p:extLst>
-              <p:ext uri="{386F3935-93C4-4BCD-93E2-E3B085C9AB24}">
-                <p16:designElem xmlns:p16="http://schemas.microsoft.com/office/powerpoint/2015/main" val="1"/>
-              </p:ext>
-            </p:extLst>
-          </p:nvPr>
-        </p:nvSpPr>
-        <p:spPr>
-          <a:xfrm>
-            <a:off x="0" y="0"/>
-            <a:ext cx="18288000" cy="10287000"/>
-          </a:xfrm>
-          <a:prstGeom prst="rect">
-            <a:avLst/>
-          </a:prstGeom>
-          <a:solidFill>
-            <a:schemeClr val="bg1"/>
-          </a:solidFill>
-          <a:ln>
-            <a:noFill/>
-          </a:ln>
-        </p:spPr>
-        <p:style>
-          <a:lnRef idx="2">
-            <a:schemeClr val="accent1">
-              <a:shade val="50000"/>
-            </a:schemeClr>
-          </a:lnRef>
-          <a:fillRef idx="1">
-            <a:schemeClr val="accent1"/>
-          </a:fillRef>
-          <a:effectRef idx="0">
-            <a:schemeClr val="accent1"/>
-          </a:effectRef>
-          <a:fontRef idx="minor">
-            <a:schemeClr val="lt1"/>
-          </a:fontRef>
-        </p:style>
-        <p:txBody>
-          <a:bodyPr rtlCol="0" anchor="ctr"/>
-          <a:lstStyle/>
-          <a:p>
-            <a:pPr algn="ctr"/>
-            <a:endParaRPr lang="en-US" dirty="0"/>
-          </a:p>
-        </p:txBody>
-      </p:sp>
-      <p:sp>
-        <p:nvSpPr>
-          <p:cNvPr id="10" name="Freeform: Shape 9">
-            <a:extLst>
-              <a:ext uri="{FF2B5EF4-FFF2-40B4-BE49-F238E27FC236}">
-                <a16:creationId xmlns:a16="http://schemas.microsoft.com/office/drawing/2014/main" id="{83C98ABE-055B-441F-B07E-44F97F083C39}"/>
-              </a:ext>
-              <a:ext uri="{C183D7F6-B498-43B3-948B-1728B52AA6E4}">
-                <adec:decorative xmlns:adec="http://schemas.microsoft.com/office/drawing/2017/decorative" val="1"/>
-              </a:ext>
-            </a:extLst>
-          </p:cNvPr>
-          <p:cNvSpPr>
-            <a:spLocks noGrp="1" noRot="1" noChangeAspect="1" noMove="1" noResize="1" noEditPoints="1" noAdjustHandles="1" noChangeArrowheads="1" noChangeShapeType="1" noTextEdit="1"/>
-          </p:cNvSpPr>
-          <p:nvPr>
-            <p:extLst>
-              <p:ext uri="{386F3935-93C4-4BCD-93E2-E3B085C9AB24}">
-                <p16:designElem xmlns:p16="http://schemas.microsoft.com/office/powerpoint/2015/main" val="1"/>
-              </p:ext>
-            </p:extLst>
-          </p:nvPr>
-        </p:nvSpPr>
-        <p:spPr>
-          <a:xfrm rot="18900000" flipH="1">
-            <a:off x="-564234" y="-380505"/>
-            <a:ext cx="2741457" cy="2065483"/>
-          </a:xfrm>
-          <a:custGeom>
-            <a:avLst/>
-            <a:gdLst>
-              <a:gd name="connsiteX0" fmla="*/ 0 w 1827638"/>
-              <a:gd name="connsiteY0" fmla="*/ 987379 h 1376989"/>
-              <a:gd name="connsiteX1" fmla="*/ 987379 w 1827638"/>
-              <a:gd name="connsiteY1" fmla="*/ 0 h 1376989"/>
-              <a:gd name="connsiteX2" fmla="*/ 1827638 w 1827638"/>
-              <a:gd name="connsiteY2" fmla="*/ 840260 h 1376989"/>
-              <a:gd name="connsiteX3" fmla="*/ 1827638 w 1827638"/>
-              <a:gd name="connsiteY3" fmla="*/ 1376989 h 1376989"/>
-              <a:gd name="connsiteX4" fmla="*/ 0 w 1827638"/>
-              <a:gd name="connsiteY4" fmla="*/ 1376989 h 1376989"/>
-            </a:gdLst>
-            <a:ahLst/>
-            <a:cxnLst>
-              <a:cxn ang="0">
-                <a:pos x="connsiteX0" y="connsiteY0"/>
-              </a:cxn>
-              <a:cxn ang="0">
-                <a:pos x="connsiteX1" y="connsiteY1"/>
-              </a:cxn>
-              <a:cxn ang="0">
-                <a:pos x="connsiteX2" y="connsiteY2"/>
-              </a:cxn>
-              <a:cxn ang="0">
-                <a:pos x="connsiteX3" y="connsiteY3"/>
-              </a:cxn>
-              <a:cxn ang="0">
-                <a:pos x="connsiteX4" y="connsiteY4"/>
-              </a:cxn>
-            </a:cxnLst>
-            <a:rect l="l" t="t" r="r" b="b"/>
-            <a:pathLst>
-              <a:path w="1827638" h="1376989">
-                <a:moveTo>
-                  <a:pt x="0" y="987379"/>
-                </a:moveTo>
-                <a:lnTo>
-                  <a:pt x="987379" y="0"/>
-                </a:lnTo>
-                <a:lnTo>
-                  <a:pt x="1827638" y="840260"/>
-                </a:lnTo>
-                <a:lnTo>
-                  <a:pt x="1827638" y="1376989"/>
-                </a:lnTo>
-                <a:lnTo>
-                  <a:pt x="0" y="1376989"/>
-                </a:lnTo>
-                <a:close/>
-              </a:path>
-            </a:pathLst>
-          </a:custGeom>
-          <a:solidFill>
-            <a:schemeClr val="accent1">
-              <a:alpha val="30000"/>
-            </a:schemeClr>
-          </a:solidFill>
-          <a:ln>
-            <a:noFill/>
-          </a:ln>
-        </p:spPr>
-        <p:style>
-          <a:lnRef idx="2">
-            <a:schemeClr val="accent1">
-              <a:shade val="50000"/>
-            </a:schemeClr>
-          </a:lnRef>
-          <a:fillRef idx="1">
-            <a:schemeClr val="accent1"/>
-          </a:fillRef>
-          <a:effectRef idx="0">
-            <a:schemeClr val="accent1"/>
-          </a:effectRef>
-          <a:fontRef idx="minor">
-            <a:schemeClr val="lt1"/>
-          </a:fontRef>
-        </p:style>
-        <p:txBody>
-          <a:bodyPr rtlCol="0" anchor="ctr"/>
-          <a:lstStyle/>
-          <a:p>
-            <a:pPr algn="ctr"/>
-            <a:endParaRPr lang="en-US" dirty="0"/>
-          </a:p>
-        </p:txBody>
-      </p:sp>
-      <p:sp>
-        <p:nvSpPr>
-          <p:cNvPr id="12" name="Rectangle 11">
-            <a:extLst>
-              <a:ext uri="{FF2B5EF4-FFF2-40B4-BE49-F238E27FC236}">
-                <a16:creationId xmlns:a16="http://schemas.microsoft.com/office/drawing/2014/main" id="{29FDB030-9B49-4CED-8CCD-4D99382388AC}"/>
-              </a:ext>
-              <a:ext uri="{C183D7F6-B498-43B3-948B-1728B52AA6E4}">
-                <adec:decorative xmlns:adec="http://schemas.microsoft.com/office/drawing/2017/decorative" val="1"/>
-              </a:ext>
-            </a:extLst>
-          </p:cNvPr>
-          <p:cNvSpPr>
-            <a:spLocks noGrp="1" noRot="1" noChangeAspect="1" noMove="1" noResize="1" noEditPoints="1" noAdjustHandles="1" noChangeArrowheads="1" noChangeShapeType="1" noTextEdit="1"/>
-          </p:cNvSpPr>
-          <p:nvPr>
-            <p:extLst>
-              <p:ext uri="{386F3935-93C4-4BCD-93E2-E3B085C9AB24}">
-                <p16:designElem xmlns:p16="http://schemas.microsoft.com/office/powerpoint/2015/main" val="1"/>
-              </p:ext>
-            </p:extLst>
-          </p:nvPr>
-        </p:nvSpPr>
-        <p:spPr>
-          <a:xfrm rot="18900000" flipH="1">
-            <a:off x="1337461" y="633219"/>
-            <a:ext cx="968052" cy="968052"/>
-          </a:xfrm>
-          <a:prstGeom prst="rect">
-            <a:avLst/>
-          </a:prstGeom>
-          <a:solidFill>
-            <a:schemeClr val="accent1">
-              <a:alpha val="30000"/>
-            </a:schemeClr>
-          </a:solidFill>
-          <a:ln>
-            <a:noFill/>
-          </a:ln>
-        </p:spPr>
-        <p:style>
-          <a:lnRef idx="2">
-            <a:schemeClr val="accent1">
-              <a:shade val="50000"/>
-            </a:schemeClr>
-          </a:lnRef>
-          <a:fillRef idx="1">
-            <a:schemeClr val="accent1"/>
-          </a:fillRef>
-          <a:effectRef idx="0">
-            <a:schemeClr val="accent1"/>
-          </a:effectRef>
-          <a:fontRef idx="minor">
-            <a:schemeClr val="lt1"/>
-          </a:fontRef>
-        </p:style>
-        <p:txBody>
-          <a:bodyPr rtlCol="0" anchor="ctr"/>
-          <a:lstStyle/>
-          <a:p>
-            <a:pPr algn="ctr"/>
-            <a:endParaRPr lang="en-US"/>
-          </a:p>
-        </p:txBody>
-      </p:sp>
-      <p:sp>
-        <p:nvSpPr>
-          <p:cNvPr id="14" name="Rectangle 13">
-            <a:extLst>
-              <a:ext uri="{FF2B5EF4-FFF2-40B4-BE49-F238E27FC236}">
-                <a16:creationId xmlns:a16="http://schemas.microsoft.com/office/drawing/2014/main" id="{3783CA14-24A1-485C-8B30-D6A5D87987AD}"/>
-              </a:ext>
-              <a:ext uri="{C183D7F6-B498-43B3-948B-1728B52AA6E4}">
-                <adec:decorative xmlns:adec="http://schemas.microsoft.com/office/drawing/2017/decorative" val="1"/>
-              </a:ext>
-            </a:extLst>
-          </p:cNvPr>
-          <p:cNvSpPr>
-            <a:spLocks noGrp="1" noRot="1" noChangeAspect="1" noMove="1" noResize="1" noEditPoints="1" noAdjustHandles="1" noChangeArrowheads="1" noChangeShapeType="1" noTextEdit="1"/>
-          </p:cNvSpPr>
-          <p:nvPr>
-            <p:extLst>
-              <p:ext uri="{386F3935-93C4-4BCD-93E2-E3B085C9AB24}">
-                <p16:designElem xmlns:p16="http://schemas.microsoft.com/office/powerpoint/2015/main" val="1"/>
-              </p:ext>
-            </p:extLst>
-          </p:nvPr>
-        </p:nvSpPr>
-        <p:spPr>
-          <a:xfrm rot="18900000" flipH="1">
-            <a:off x="15065223" y="982710"/>
-            <a:ext cx="1031208" cy="1031208"/>
-          </a:xfrm>
-          <a:prstGeom prst="rect">
-            <a:avLst/>
-          </a:prstGeom>
-          <a:solidFill>
-            <a:schemeClr val="accent4">
-              <a:alpha val="30000"/>
-            </a:schemeClr>
-          </a:solidFill>
-          <a:ln>
-            <a:noFill/>
-          </a:ln>
-        </p:spPr>
-        <p:style>
-          <a:lnRef idx="2">
-            <a:schemeClr val="accent1">
-              <a:shade val="50000"/>
-            </a:schemeClr>
-          </a:lnRef>
-          <a:fillRef idx="1">
-            <a:schemeClr val="accent1"/>
-          </a:fillRef>
-          <a:effectRef idx="0">
-            <a:schemeClr val="accent1"/>
-          </a:effectRef>
-          <a:fontRef idx="minor">
-            <a:schemeClr val="lt1"/>
-          </a:fontRef>
-        </p:style>
-        <p:txBody>
-          <a:bodyPr rtlCol="0" anchor="ctr"/>
-          <a:lstStyle/>
-          <a:p>
-            <a:pPr algn="ctr"/>
-            <a:endParaRPr lang="en-US"/>
-          </a:p>
-        </p:txBody>
-      </p:sp>
-      <p:sp>
-        <p:nvSpPr>
-          <p:cNvPr id="16" name="Freeform: Shape 15">
-            <a:extLst>
-              <a:ext uri="{FF2B5EF4-FFF2-40B4-BE49-F238E27FC236}">
-                <a16:creationId xmlns:a16="http://schemas.microsoft.com/office/drawing/2014/main" id="{9A97C86A-04D6-40F7-AE84-31AB43E6A846}"/>
-              </a:ext>
-              <a:ext uri="{C183D7F6-B498-43B3-948B-1728B52AA6E4}">
-                <adec:decorative xmlns:adec="http://schemas.microsoft.com/office/drawing/2017/decorative" val="1"/>
-              </a:ext>
-            </a:extLst>
-          </p:cNvPr>
-          <p:cNvSpPr>
-            <a:spLocks noGrp="1" noRot="1" noChangeAspect="1" noMove="1" noResize="1" noEditPoints="1" noAdjustHandles="1" noChangeArrowheads="1" noChangeShapeType="1" noTextEdit="1"/>
-          </p:cNvSpPr>
-          <p:nvPr>
-            <p:extLst>
-              <p:ext uri="{386F3935-93C4-4BCD-93E2-E3B085C9AB24}">
-                <p16:designElem xmlns:p16="http://schemas.microsoft.com/office/powerpoint/2015/main" val="1"/>
-              </p:ext>
-            </p:extLst>
-          </p:nvPr>
-        </p:nvSpPr>
-        <p:spPr>
-          <a:xfrm rot="10800000" flipH="1">
-            <a:off x="14034964" y="0"/>
-            <a:ext cx="4253036" cy="2221255"/>
-          </a:xfrm>
-          <a:custGeom>
-            <a:avLst/>
-            <a:gdLst>
-              <a:gd name="connsiteX0" fmla="*/ 2835357 w 2835357"/>
-              <a:gd name="connsiteY0" fmla="*/ 1480837 h 1480837"/>
-              <a:gd name="connsiteX1" fmla="*/ 0 w 2835357"/>
-              <a:gd name="connsiteY1" fmla="*/ 1480837 h 1480837"/>
-              <a:gd name="connsiteX2" fmla="*/ 1552727 w 2835357"/>
-              <a:gd name="connsiteY2" fmla="*/ 0 h 1480837"/>
-              <a:gd name="connsiteX3" fmla="*/ 2835357 w 2835357"/>
-              <a:gd name="connsiteY3" fmla="*/ 1223245 h 1480837"/>
-            </a:gdLst>
-            <a:ahLst/>
-            <a:cxnLst>
-              <a:cxn ang="0">
-                <a:pos x="connsiteX0" y="connsiteY0"/>
-              </a:cxn>
-              <a:cxn ang="0">
-                <a:pos x="connsiteX1" y="connsiteY1"/>
-              </a:cxn>
-              <a:cxn ang="0">
-                <a:pos x="connsiteX2" y="connsiteY2"/>
-              </a:cxn>
-              <a:cxn ang="0">
-                <a:pos x="connsiteX3" y="connsiteY3"/>
-              </a:cxn>
-            </a:cxnLst>
-            <a:rect l="l" t="t" r="r" b="b"/>
-            <a:pathLst>
-              <a:path w="2835357" h="1480837">
-                <a:moveTo>
-                  <a:pt x="2835357" y="1480837"/>
-                </a:moveTo>
-                <a:lnTo>
-                  <a:pt x="0" y="1480837"/>
-                </a:lnTo>
-                <a:lnTo>
-                  <a:pt x="1552727" y="0"/>
-                </a:lnTo>
-                <a:lnTo>
-                  <a:pt x="2835357" y="1223245"/>
-                </a:lnTo>
-                <a:close/>
-              </a:path>
-            </a:pathLst>
-          </a:custGeom>
-          <a:solidFill>
-            <a:schemeClr val="accent4">
-              <a:alpha val="30000"/>
-            </a:schemeClr>
-          </a:solidFill>
-          <a:ln>
-            <a:noFill/>
-          </a:ln>
-        </p:spPr>
-        <p:style>
-          <a:lnRef idx="2">
-            <a:schemeClr val="accent1">
-              <a:shade val="50000"/>
-            </a:schemeClr>
-          </a:lnRef>
-          <a:fillRef idx="1">
-            <a:schemeClr val="accent1"/>
-          </a:fillRef>
-          <a:effectRef idx="0">
-            <a:schemeClr val="accent1"/>
-          </a:effectRef>
-          <a:fontRef idx="minor">
-            <a:schemeClr val="lt1"/>
-          </a:fontRef>
-        </p:style>
-        <p:txBody>
-          <a:bodyPr wrap="square" rtlCol="0" anchor="ctr">
-            <a:noAutofit/>
-          </a:bodyPr>
-          <a:lstStyle/>
-          <a:p>
-            <a:pPr algn="ctr"/>
-            <a:endParaRPr lang="en-US" dirty="0"/>
-          </a:p>
-        </p:txBody>
-      </p:sp>
-      <p:sp>
-        <p:nvSpPr>
-          <p:cNvPr id="18" name="Isosceles Triangle 17">
-            <a:extLst>
-              <a:ext uri="{FF2B5EF4-FFF2-40B4-BE49-F238E27FC236}">
-                <a16:creationId xmlns:a16="http://schemas.microsoft.com/office/drawing/2014/main" id="{FF9F2414-84E8-453E-B1F3-389FDE8192D9}"/>
-              </a:ext>
-              <a:ext uri="{C183D7F6-B498-43B3-948B-1728B52AA6E4}">
-                <adec:decorative xmlns:adec="http://schemas.microsoft.com/office/drawing/2017/decorative" val="1"/>
-              </a:ext>
-            </a:extLst>
-          </p:cNvPr>
-          <p:cNvSpPr>
-            <a:spLocks noGrp="1" noRot="1" noChangeAspect="1" noMove="1" noResize="1" noEditPoints="1" noAdjustHandles="1" noChangeArrowheads="1" noChangeShapeType="1" noTextEdit="1"/>
-          </p:cNvSpPr>
-          <p:nvPr>
-            <p:extLst>
-              <p:ext uri="{386F3935-93C4-4BCD-93E2-E3B085C9AB24}">
-                <p16:designElem xmlns:p16="http://schemas.microsoft.com/office/powerpoint/2015/main" val="1"/>
-              </p:ext>
-            </p:extLst>
-          </p:nvPr>
-        </p:nvSpPr>
-        <p:spPr>
-          <a:xfrm flipH="1">
-            <a:off x="11964516" y="9173251"/>
-            <a:ext cx="2241769" cy="1113749"/>
-          </a:xfrm>
-          <a:prstGeom prst="triangle">
-            <a:avLst/>
-          </a:prstGeom>
-          <a:solidFill>
-            <a:schemeClr val="accent1">
-              <a:alpha val="30000"/>
-            </a:schemeClr>
-          </a:solidFill>
-          <a:ln>
-            <a:noFill/>
-          </a:ln>
-        </p:spPr>
-        <p:style>
-          <a:lnRef idx="2">
-            <a:schemeClr val="accent1">
-              <a:shade val="50000"/>
-            </a:schemeClr>
-          </a:lnRef>
-          <a:fillRef idx="1">
-            <a:schemeClr val="accent1"/>
-          </a:fillRef>
-          <a:effectRef idx="0">
-            <a:schemeClr val="accent1"/>
-          </a:effectRef>
-          <a:fontRef idx="minor">
-            <a:schemeClr val="lt1"/>
-          </a:fontRef>
-        </p:style>
-        <p:txBody>
-          <a:bodyPr rtlCol="0" anchor="ctr"/>
-          <a:lstStyle/>
-          <a:p>
-            <a:pPr algn="ctr"/>
-            <a:endParaRPr lang="en-US"/>
-          </a:p>
-        </p:txBody>
-      </p:sp>
       <p:pic>
         <p:nvPicPr>
-          <p:cNvPr id="3" name="Picture 2">
+          <p:cNvPr id="3" name="Picture 2" descr="A graph of coffee rating&#10;&#10;AI-generated content may be incorrect.">
             <a:extLst>
               <a:ext uri="{FF2B5EF4-FFF2-40B4-BE49-F238E27FC236}">
                 <a16:creationId xmlns:a16="http://schemas.microsoft.com/office/drawing/2014/main" id="{C7485B0E-4160-4801-C546-6185064FA6A2}"/>
@@ -6780,87 +4417,20 @@
               </a:ext>
             </a:extLst>
           </a:blip>
-          <a:srcRect/>
-          <a:stretch/>
+          <a:stretch>
+            <a:fillRect/>
+          </a:stretch>
         </p:blipFill>
         <p:spPr>
           <a:xfrm>
-            <a:off x="914410" y="6"/>
-            <a:ext cx="16459183" cy="10286988"/>
+            <a:off x="2743200" y="1066800"/>
+            <a:ext cx="13045441" cy="8153400"/>
           </a:xfrm>
           <a:prstGeom prst="rect">
             <a:avLst/>
           </a:prstGeom>
-          <a:ln>
-            <a:noFill/>
-          </a:ln>
         </p:spPr>
       </p:pic>
-      <p:sp>
-        <p:nvSpPr>
-          <p:cNvPr id="20" name="Isosceles Triangle 19">
-            <a:extLst>
-              <a:ext uri="{FF2B5EF4-FFF2-40B4-BE49-F238E27FC236}">
-                <a16:creationId xmlns:a16="http://schemas.microsoft.com/office/drawing/2014/main" id="{3ECA69A1-7536-43AC-85EF-C7106179F5ED}"/>
-              </a:ext>
-              <a:ext uri="{C183D7F6-B498-43B3-948B-1728B52AA6E4}">
-                <adec:decorative xmlns:adec="http://schemas.microsoft.com/office/drawing/2017/decorative" val="1"/>
-              </a:ext>
-            </a:extLst>
-          </p:cNvPr>
-          <p:cNvSpPr>
-            <a:spLocks noGrp="1" noRot="1" noChangeAspect="1" noMove="1" noResize="1" noEditPoints="1" noAdjustHandles="1" noChangeArrowheads="1" noChangeShapeType="1" noTextEdit="1"/>
-          </p:cNvSpPr>
-          <p:nvPr>
-            <p:extLst>
-              <p:ext uri="{386F3935-93C4-4BCD-93E2-E3B085C9AB24}">
-                <p16:designElem xmlns:p16="http://schemas.microsoft.com/office/powerpoint/2015/main" val="1"/>
-              </p:ext>
-            </p:extLst>
-          </p:nvPr>
-        </p:nvSpPr>
-        <p:spPr>
-          <a:xfrm flipH="1">
-            <a:off x="11406120" y="9679714"/>
-            <a:ext cx="1222354" cy="607286"/>
-          </a:xfrm>
-          <a:prstGeom prst="triangle">
-            <a:avLst/>
-          </a:prstGeom>
-          <a:solidFill>
-            <a:schemeClr val="accent1">
-              <a:alpha val="30000"/>
-            </a:schemeClr>
-          </a:solidFill>
-          <a:ln>
-            <a:noFill/>
-          </a:ln>
-        </p:spPr>
-        <p:style>
-          <a:lnRef idx="2">
-            <a:schemeClr val="accent1">
-              <a:shade val="50000"/>
-            </a:schemeClr>
-          </a:lnRef>
-          <a:fillRef idx="1">
-            <a:schemeClr val="accent1"/>
-          </a:fillRef>
-          <a:effectRef idx="0">
-            <a:schemeClr val="accent1"/>
-          </a:effectRef>
-          <a:fontRef idx="minor">
-            <a:schemeClr val="lt1"/>
-          </a:fontRef>
-        </p:style>
-        <p:txBody>
-          <a:bodyPr rtlCol="0" anchor="ctr"/>
-          <a:lstStyle/>
-          <a:p>
-            <a:pPr algn="ctr"/>
-            <a:endParaRPr lang="en-US"/>
-          </a:p>
-        </p:txBody>
-      </p:sp>
     </p:spTree>
     <p:extLst>
       <p:ext uri="{BB962C8B-B14F-4D97-AF65-F5344CB8AC3E}">
@@ -6874,13 +4444,13 @@
 </p:sld>
 </file>
 
-<file path=ppt/slides/slide7.xml><?xml version="1.0" encoding="utf-8"?>
+<file path=ppt/slides/slide6.xml><?xml version="1.0" encoding="utf-8"?>
 <p:sld xmlns:a="http://schemas.openxmlformats.org/drawingml/2006/main" xmlns:r="http://schemas.openxmlformats.org/officeDocument/2006/relationships" xmlns:p="http://schemas.openxmlformats.org/presentationml/2006/main">
   <p:cSld>
     <p:bg>
       <p:bgPr>
         <a:solidFill>
-          <a:schemeClr val="bg1"/>
+          <a:srgbClr val="F8EFE5"/>
         </a:solidFill>
         <a:effectLst/>
       </p:bgPr>
@@ -6905,490 +4475,6 @@
           <a:chExt cx="0" cy="0"/>
         </a:xfrm>
       </p:grpSpPr>
-      <p:sp>
-        <p:nvSpPr>
-          <p:cNvPr id="9" name="Rectangle 8">
-            <a:extLst>
-              <a:ext uri="{FF2B5EF4-FFF2-40B4-BE49-F238E27FC236}">
-                <a16:creationId xmlns:a16="http://schemas.microsoft.com/office/drawing/2014/main" id="{F3060C83-F051-4F0E-ABAD-AA0DFC48B218}"/>
-              </a:ext>
-              <a:ext uri="{C183D7F6-B498-43B3-948B-1728B52AA6E4}">
-                <adec:decorative xmlns:adec="http://schemas.microsoft.com/office/drawing/2017/decorative" val="1"/>
-              </a:ext>
-            </a:extLst>
-          </p:cNvPr>
-          <p:cNvSpPr>
-            <a:spLocks noGrp="1" noRot="1" noChangeAspect="1" noMove="1" noResize="1" noEditPoints="1" noAdjustHandles="1" noChangeArrowheads="1" noChangeShapeType="1" noTextEdit="1"/>
-          </p:cNvSpPr>
-          <p:nvPr>
-            <p:extLst>
-              <p:ext uri="{386F3935-93C4-4BCD-93E2-E3B085C9AB24}">
-                <p16:designElem xmlns:p16="http://schemas.microsoft.com/office/powerpoint/2015/main" val="1"/>
-              </p:ext>
-            </p:extLst>
-          </p:nvPr>
-        </p:nvSpPr>
-        <p:spPr>
-          <a:xfrm>
-            <a:off x="0" y="0"/>
-            <a:ext cx="18288000" cy="10287000"/>
-          </a:xfrm>
-          <a:prstGeom prst="rect">
-            <a:avLst/>
-          </a:prstGeom>
-          <a:solidFill>
-            <a:schemeClr val="bg1"/>
-          </a:solidFill>
-          <a:ln>
-            <a:noFill/>
-          </a:ln>
-        </p:spPr>
-        <p:style>
-          <a:lnRef idx="2">
-            <a:schemeClr val="accent1">
-              <a:shade val="50000"/>
-            </a:schemeClr>
-          </a:lnRef>
-          <a:fillRef idx="1">
-            <a:schemeClr val="accent1"/>
-          </a:fillRef>
-          <a:effectRef idx="0">
-            <a:schemeClr val="accent1"/>
-          </a:effectRef>
-          <a:fontRef idx="minor">
-            <a:schemeClr val="lt1"/>
-          </a:fontRef>
-        </p:style>
-        <p:txBody>
-          <a:bodyPr rtlCol="0" anchor="ctr"/>
-          <a:lstStyle/>
-          <a:p>
-            <a:pPr algn="ctr"/>
-            <a:endParaRPr lang="en-US" dirty="0"/>
-          </a:p>
-        </p:txBody>
-      </p:sp>
-      <p:sp>
-        <p:nvSpPr>
-          <p:cNvPr id="11" name="Freeform: Shape 10">
-            <a:extLst>
-              <a:ext uri="{FF2B5EF4-FFF2-40B4-BE49-F238E27FC236}">
-                <a16:creationId xmlns:a16="http://schemas.microsoft.com/office/drawing/2014/main" id="{83C98ABE-055B-441F-B07E-44F97F083C39}"/>
-              </a:ext>
-              <a:ext uri="{C183D7F6-B498-43B3-948B-1728B52AA6E4}">
-                <adec:decorative xmlns:adec="http://schemas.microsoft.com/office/drawing/2017/decorative" val="1"/>
-              </a:ext>
-            </a:extLst>
-          </p:cNvPr>
-          <p:cNvSpPr>
-            <a:spLocks noGrp="1" noRot="1" noChangeAspect="1" noMove="1" noResize="1" noEditPoints="1" noAdjustHandles="1" noChangeArrowheads="1" noChangeShapeType="1" noTextEdit="1"/>
-          </p:cNvSpPr>
-          <p:nvPr>
-            <p:extLst>
-              <p:ext uri="{386F3935-93C4-4BCD-93E2-E3B085C9AB24}">
-                <p16:designElem xmlns:p16="http://schemas.microsoft.com/office/powerpoint/2015/main" val="1"/>
-              </p:ext>
-            </p:extLst>
-          </p:nvPr>
-        </p:nvSpPr>
-        <p:spPr>
-          <a:xfrm rot="18900000" flipH="1">
-            <a:off x="-564234" y="-380505"/>
-            <a:ext cx="2741457" cy="2065483"/>
-          </a:xfrm>
-          <a:custGeom>
-            <a:avLst/>
-            <a:gdLst>
-              <a:gd name="connsiteX0" fmla="*/ 0 w 1827638"/>
-              <a:gd name="connsiteY0" fmla="*/ 987379 h 1376989"/>
-              <a:gd name="connsiteX1" fmla="*/ 987379 w 1827638"/>
-              <a:gd name="connsiteY1" fmla="*/ 0 h 1376989"/>
-              <a:gd name="connsiteX2" fmla="*/ 1827638 w 1827638"/>
-              <a:gd name="connsiteY2" fmla="*/ 840260 h 1376989"/>
-              <a:gd name="connsiteX3" fmla="*/ 1827638 w 1827638"/>
-              <a:gd name="connsiteY3" fmla="*/ 1376989 h 1376989"/>
-              <a:gd name="connsiteX4" fmla="*/ 0 w 1827638"/>
-              <a:gd name="connsiteY4" fmla="*/ 1376989 h 1376989"/>
-            </a:gdLst>
-            <a:ahLst/>
-            <a:cxnLst>
-              <a:cxn ang="0">
-                <a:pos x="connsiteX0" y="connsiteY0"/>
-              </a:cxn>
-              <a:cxn ang="0">
-                <a:pos x="connsiteX1" y="connsiteY1"/>
-              </a:cxn>
-              <a:cxn ang="0">
-                <a:pos x="connsiteX2" y="connsiteY2"/>
-              </a:cxn>
-              <a:cxn ang="0">
-                <a:pos x="connsiteX3" y="connsiteY3"/>
-              </a:cxn>
-              <a:cxn ang="0">
-                <a:pos x="connsiteX4" y="connsiteY4"/>
-              </a:cxn>
-            </a:cxnLst>
-            <a:rect l="l" t="t" r="r" b="b"/>
-            <a:pathLst>
-              <a:path w="1827638" h="1376989">
-                <a:moveTo>
-                  <a:pt x="0" y="987379"/>
-                </a:moveTo>
-                <a:lnTo>
-                  <a:pt x="987379" y="0"/>
-                </a:lnTo>
-                <a:lnTo>
-                  <a:pt x="1827638" y="840260"/>
-                </a:lnTo>
-                <a:lnTo>
-                  <a:pt x="1827638" y="1376989"/>
-                </a:lnTo>
-                <a:lnTo>
-                  <a:pt x="0" y="1376989"/>
-                </a:lnTo>
-                <a:close/>
-              </a:path>
-            </a:pathLst>
-          </a:custGeom>
-          <a:solidFill>
-            <a:schemeClr val="accent1">
-              <a:alpha val="30000"/>
-            </a:schemeClr>
-          </a:solidFill>
-          <a:ln>
-            <a:noFill/>
-          </a:ln>
-        </p:spPr>
-        <p:style>
-          <a:lnRef idx="2">
-            <a:schemeClr val="accent1">
-              <a:shade val="50000"/>
-            </a:schemeClr>
-          </a:lnRef>
-          <a:fillRef idx="1">
-            <a:schemeClr val="accent1"/>
-          </a:fillRef>
-          <a:effectRef idx="0">
-            <a:schemeClr val="accent1"/>
-          </a:effectRef>
-          <a:fontRef idx="minor">
-            <a:schemeClr val="lt1"/>
-          </a:fontRef>
-        </p:style>
-        <p:txBody>
-          <a:bodyPr rtlCol="0" anchor="ctr"/>
-          <a:lstStyle/>
-          <a:p>
-            <a:pPr algn="ctr"/>
-            <a:endParaRPr lang="en-US" dirty="0"/>
-          </a:p>
-        </p:txBody>
-      </p:sp>
-      <p:sp>
-        <p:nvSpPr>
-          <p:cNvPr id="13" name="Rectangle 12">
-            <a:extLst>
-              <a:ext uri="{FF2B5EF4-FFF2-40B4-BE49-F238E27FC236}">
-                <a16:creationId xmlns:a16="http://schemas.microsoft.com/office/drawing/2014/main" id="{29FDB030-9B49-4CED-8CCD-4D99382388AC}"/>
-              </a:ext>
-              <a:ext uri="{C183D7F6-B498-43B3-948B-1728B52AA6E4}">
-                <adec:decorative xmlns:adec="http://schemas.microsoft.com/office/drawing/2017/decorative" val="1"/>
-              </a:ext>
-            </a:extLst>
-          </p:cNvPr>
-          <p:cNvSpPr>
-            <a:spLocks noGrp="1" noRot="1" noChangeAspect="1" noMove="1" noResize="1" noEditPoints="1" noAdjustHandles="1" noChangeArrowheads="1" noChangeShapeType="1" noTextEdit="1"/>
-          </p:cNvSpPr>
-          <p:nvPr>
-            <p:extLst>
-              <p:ext uri="{386F3935-93C4-4BCD-93E2-E3B085C9AB24}">
-                <p16:designElem xmlns:p16="http://schemas.microsoft.com/office/powerpoint/2015/main" val="1"/>
-              </p:ext>
-            </p:extLst>
-          </p:nvPr>
-        </p:nvSpPr>
-        <p:spPr>
-          <a:xfrm rot="18900000" flipH="1">
-            <a:off x="1337461" y="633219"/>
-            <a:ext cx="968052" cy="968052"/>
-          </a:xfrm>
-          <a:prstGeom prst="rect">
-            <a:avLst/>
-          </a:prstGeom>
-          <a:solidFill>
-            <a:schemeClr val="accent1">
-              <a:alpha val="30000"/>
-            </a:schemeClr>
-          </a:solidFill>
-          <a:ln>
-            <a:noFill/>
-          </a:ln>
-        </p:spPr>
-        <p:style>
-          <a:lnRef idx="2">
-            <a:schemeClr val="accent1">
-              <a:shade val="50000"/>
-            </a:schemeClr>
-          </a:lnRef>
-          <a:fillRef idx="1">
-            <a:schemeClr val="accent1"/>
-          </a:fillRef>
-          <a:effectRef idx="0">
-            <a:schemeClr val="accent1"/>
-          </a:effectRef>
-          <a:fontRef idx="minor">
-            <a:schemeClr val="lt1"/>
-          </a:fontRef>
-        </p:style>
-        <p:txBody>
-          <a:bodyPr rtlCol="0" anchor="ctr"/>
-          <a:lstStyle/>
-          <a:p>
-            <a:pPr algn="ctr"/>
-            <a:endParaRPr lang="en-US"/>
-          </a:p>
-        </p:txBody>
-      </p:sp>
-      <p:sp>
-        <p:nvSpPr>
-          <p:cNvPr id="15" name="Rectangle 14">
-            <a:extLst>
-              <a:ext uri="{FF2B5EF4-FFF2-40B4-BE49-F238E27FC236}">
-                <a16:creationId xmlns:a16="http://schemas.microsoft.com/office/drawing/2014/main" id="{3783CA14-24A1-485C-8B30-D6A5D87987AD}"/>
-              </a:ext>
-              <a:ext uri="{C183D7F6-B498-43B3-948B-1728B52AA6E4}">
-                <adec:decorative xmlns:adec="http://schemas.microsoft.com/office/drawing/2017/decorative" val="1"/>
-              </a:ext>
-            </a:extLst>
-          </p:cNvPr>
-          <p:cNvSpPr>
-            <a:spLocks noGrp="1" noRot="1" noChangeAspect="1" noMove="1" noResize="1" noEditPoints="1" noAdjustHandles="1" noChangeArrowheads="1" noChangeShapeType="1" noTextEdit="1"/>
-          </p:cNvSpPr>
-          <p:nvPr>
-            <p:extLst>
-              <p:ext uri="{386F3935-93C4-4BCD-93E2-E3B085C9AB24}">
-                <p16:designElem xmlns:p16="http://schemas.microsoft.com/office/powerpoint/2015/main" val="1"/>
-              </p:ext>
-            </p:extLst>
-          </p:nvPr>
-        </p:nvSpPr>
-        <p:spPr>
-          <a:xfrm rot="18900000" flipH="1">
-            <a:off x="15065223" y="982710"/>
-            <a:ext cx="1031208" cy="1031208"/>
-          </a:xfrm>
-          <a:prstGeom prst="rect">
-            <a:avLst/>
-          </a:prstGeom>
-          <a:solidFill>
-            <a:schemeClr val="accent4">
-              <a:alpha val="30000"/>
-            </a:schemeClr>
-          </a:solidFill>
-          <a:ln>
-            <a:noFill/>
-          </a:ln>
-        </p:spPr>
-        <p:style>
-          <a:lnRef idx="2">
-            <a:schemeClr val="accent1">
-              <a:shade val="50000"/>
-            </a:schemeClr>
-          </a:lnRef>
-          <a:fillRef idx="1">
-            <a:schemeClr val="accent1"/>
-          </a:fillRef>
-          <a:effectRef idx="0">
-            <a:schemeClr val="accent1"/>
-          </a:effectRef>
-          <a:fontRef idx="minor">
-            <a:schemeClr val="lt1"/>
-          </a:fontRef>
-        </p:style>
-        <p:txBody>
-          <a:bodyPr rtlCol="0" anchor="ctr"/>
-          <a:lstStyle/>
-          <a:p>
-            <a:pPr algn="ctr"/>
-            <a:endParaRPr lang="en-US"/>
-          </a:p>
-        </p:txBody>
-      </p:sp>
-      <p:sp>
-        <p:nvSpPr>
-          <p:cNvPr id="17" name="Freeform: Shape 16">
-            <a:extLst>
-              <a:ext uri="{FF2B5EF4-FFF2-40B4-BE49-F238E27FC236}">
-                <a16:creationId xmlns:a16="http://schemas.microsoft.com/office/drawing/2014/main" id="{9A97C86A-04D6-40F7-AE84-31AB43E6A846}"/>
-              </a:ext>
-              <a:ext uri="{C183D7F6-B498-43B3-948B-1728B52AA6E4}">
-                <adec:decorative xmlns:adec="http://schemas.microsoft.com/office/drawing/2017/decorative" val="1"/>
-              </a:ext>
-            </a:extLst>
-          </p:cNvPr>
-          <p:cNvSpPr>
-            <a:spLocks noGrp="1" noRot="1" noChangeAspect="1" noMove="1" noResize="1" noEditPoints="1" noAdjustHandles="1" noChangeArrowheads="1" noChangeShapeType="1" noTextEdit="1"/>
-          </p:cNvSpPr>
-          <p:nvPr>
-            <p:extLst>
-              <p:ext uri="{386F3935-93C4-4BCD-93E2-E3B085C9AB24}">
-                <p16:designElem xmlns:p16="http://schemas.microsoft.com/office/powerpoint/2015/main" val="1"/>
-              </p:ext>
-            </p:extLst>
-          </p:nvPr>
-        </p:nvSpPr>
-        <p:spPr>
-          <a:xfrm rot="10800000" flipH="1">
-            <a:off x="14034964" y="0"/>
-            <a:ext cx="4253036" cy="2221255"/>
-          </a:xfrm>
-          <a:custGeom>
-            <a:avLst/>
-            <a:gdLst>
-              <a:gd name="connsiteX0" fmla="*/ 2835357 w 2835357"/>
-              <a:gd name="connsiteY0" fmla="*/ 1480837 h 1480837"/>
-              <a:gd name="connsiteX1" fmla="*/ 0 w 2835357"/>
-              <a:gd name="connsiteY1" fmla="*/ 1480837 h 1480837"/>
-              <a:gd name="connsiteX2" fmla="*/ 1552727 w 2835357"/>
-              <a:gd name="connsiteY2" fmla="*/ 0 h 1480837"/>
-              <a:gd name="connsiteX3" fmla="*/ 2835357 w 2835357"/>
-              <a:gd name="connsiteY3" fmla="*/ 1223245 h 1480837"/>
-            </a:gdLst>
-            <a:ahLst/>
-            <a:cxnLst>
-              <a:cxn ang="0">
-                <a:pos x="connsiteX0" y="connsiteY0"/>
-              </a:cxn>
-              <a:cxn ang="0">
-                <a:pos x="connsiteX1" y="connsiteY1"/>
-              </a:cxn>
-              <a:cxn ang="0">
-                <a:pos x="connsiteX2" y="connsiteY2"/>
-              </a:cxn>
-              <a:cxn ang="0">
-                <a:pos x="connsiteX3" y="connsiteY3"/>
-              </a:cxn>
-            </a:cxnLst>
-            <a:rect l="l" t="t" r="r" b="b"/>
-            <a:pathLst>
-              <a:path w="2835357" h="1480837">
-                <a:moveTo>
-                  <a:pt x="2835357" y="1480837"/>
-                </a:moveTo>
-                <a:lnTo>
-                  <a:pt x="0" y="1480837"/>
-                </a:lnTo>
-                <a:lnTo>
-                  <a:pt x="1552727" y="0"/>
-                </a:lnTo>
-                <a:lnTo>
-                  <a:pt x="2835357" y="1223245"/>
-                </a:lnTo>
-                <a:close/>
-              </a:path>
-            </a:pathLst>
-          </a:custGeom>
-          <a:solidFill>
-            <a:schemeClr val="accent4">
-              <a:alpha val="30000"/>
-            </a:schemeClr>
-          </a:solidFill>
-          <a:ln>
-            <a:noFill/>
-          </a:ln>
-        </p:spPr>
-        <p:style>
-          <a:lnRef idx="2">
-            <a:schemeClr val="accent1">
-              <a:shade val="50000"/>
-            </a:schemeClr>
-          </a:lnRef>
-          <a:fillRef idx="1">
-            <a:schemeClr val="accent1"/>
-          </a:fillRef>
-          <a:effectRef idx="0">
-            <a:schemeClr val="accent1"/>
-          </a:effectRef>
-          <a:fontRef idx="minor">
-            <a:schemeClr val="lt1"/>
-          </a:fontRef>
-        </p:style>
-        <p:txBody>
-          <a:bodyPr wrap="square" rtlCol="0" anchor="ctr">
-            <a:noAutofit/>
-          </a:bodyPr>
-          <a:lstStyle/>
-          <a:p>
-            <a:pPr algn="ctr"/>
-            <a:endParaRPr lang="en-US" dirty="0"/>
-          </a:p>
-        </p:txBody>
-      </p:sp>
-      <p:sp>
-        <p:nvSpPr>
-          <p:cNvPr id="19" name="Isosceles Triangle 18">
-            <a:extLst>
-              <a:ext uri="{FF2B5EF4-FFF2-40B4-BE49-F238E27FC236}">
-                <a16:creationId xmlns:a16="http://schemas.microsoft.com/office/drawing/2014/main" id="{FF9F2414-84E8-453E-B1F3-389FDE8192D9}"/>
-              </a:ext>
-              <a:ext uri="{C183D7F6-B498-43B3-948B-1728B52AA6E4}">
-                <adec:decorative xmlns:adec="http://schemas.microsoft.com/office/drawing/2017/decorative" val="1"/>
-              </a:ext>
-            </a:extLst>
-          </p:cNvPr>
-          <p:cNvSpPr>
-            <a:spLocks noGrp="1" noRot="1" noChangeAspect="1" noMove="1" noResize="1" noEditPoints="1" noAdjustHandles="1" noChangeArrowheads="1" noChangeShapeType="1" noTextEdit="1"/>
-          </p:cNvSpPr>
-          <p:nvPr>
-            <p:extLst>
-              <p:ext uri="{386F3935-93C4-4BCD-93E2-E3B085C9AB24}">
-                <p16:designElem xmlns:p16="http://schemas.microsoft.com/office/powerpoint/2015/main" val="1"/>
-              </p:ext>
-            </p:extLst>
-          </p:nvPr>
-        </p:nvSpPr>
-        <p:spPr>
-          <a:xfrm flipH="1">
-            <a:off x="11964516" y="9173251"/>
-            <a:ext cx="2241769" cy="1113749"/>
-          </a:xfrm>
-          <a:prstGeom prst="triangle">
-            <a:avLst/>
-          </a:prstGeom>
-          <a:solidFill>
-            <a:schemeClr val="accent1">
-              <a:alpha val="30000"/>
-            </a:schemeClr>
-          </a:solidFill>
-          <a:ln>
-            <a:noFill/>
-          </a:ln>
-        </p:spPr>
-        <p:style>
-          <a:lnRef idx="2">
-            <a:schemeClr val="accent1">
-              <a:shade val="50000"/>
-            </a:schemeClr>
-          </a:lnRef>
-          <a:fillRef idx="1">
-            <a:schemeClr val="accent1"/>
-          </a:fillRef>
-          <a:effectRef idx="0">
-            <a:schemeClr val="accent1"/>
-          </a:effectRef>
-          <a:fontRef idx="minor">
-            <a:schemeClr val="lt1"/>
-          </a:fontRef>
-        </p:style>
-        <p:txBody>
-          <a:bodyPr rtlCol="0" anchor="ctr"/>
-          <a:lstStyle/>
-          <a:p>
-            <a:pPr algn="ctr"/>
-            <a:endParaRPr lang="en-US"/>
-          </a:p>
-        </p:txBody>
-      </p:sp>
       <p:pic>
         <p:nvPicPr>
           <p:cNvPr id="4" name="Picture 3" descr="A graph with a line and dots&#10;&#10;AI-generated content may be incorrect.">
@@ -7417,82 +4503,14 @@
         </p:blipFill>
         <p:spPr>
           <a:xfrm>
-            <a:off x="914400" y="-7"/>
-            <a:ext cx="16459200" cy="10287011"/>
+            <a:off x="2743200" y="1257300"/>
+            <a:ext cx="12923519" cy="8077199"/>
           </a:xfrm>
           <a:prstGeom prst="rect">
             <a:avLst/>
           </a:prstGeom>
-          <a:ln>
-            <a:noFill/>
-          </a:ln>
         </p:spPr>
       </p:pic>
-      <p:sp>
-        <p:nvSpPr>
-          <p:cNvPr id="21" name="Isosceles Triangle 20">
-            <a:extLst>
-              <a:ext uri="{FF2B5EF4-FFF2-40B4-BE49-F238E27FC236}">
-                <a16:creationId xmlns:a16="http://schemas.microsoft.com/office/drawing/2014/main" id="{3ECA69A1-7536-43AC-85EF-C7106179F5ED}"/>
-              </a:ext>
-              <a:ext uri="{C183D7F6-B498-43B3-948B-1728B52AA6E4}">
-                <adec:decorative xmlns:adec="http://schemas.microsoft.com/office/drawing/2017/decorative" val="1"/>
-              </a:ext>
-            </a:extLst>
-          </p:cNvPr>
-          <p:cNvSpPr>
-            <a:spLocks noGrp="1" noRot="1" noChangeAspect="1" noMove="1" noResize="1" noEditPoints="1" noAdjustHandles="1" noChangeArrowheads="1" noChangeShapeType="1" noTextEdit="1"/>
-          </p:cNvSpPr>
-          <p:nvPr>
-            <p:extLst>
-              <p:ext uri="{386F3935-93C4-4BCD-93E2-E3B085C9AB24}">
-                <p16:designElem xmlns:p16="http://schemas.microsoft.com/office/powerpoint/2015/main" val="1"/>
-              </p:ext>
-            </p:extLst>
-          </p:nvPr>
-        </p:nvSpPr>
-        <p:spPr>
-          <a:xfrm flipH="1">
-            <a:off x="11406120" y="9679714"/>
-            <a:ext cx="1222354" cy="607286"/>
-          </a:xfrm>
-          <a:prstGeom prst="triangle">
-            <a:avLst/>
-          </a:prstGeom>
-          <a:solidFill>
-            <a:schemeClr val="accent1">
-              <a:alpha val="30000"/>
-            </a:schemeClr>
-          </a:solidFill>
-          <a:ln>
-            <a:noFill/>
-          </a:ln>
-        </p:spPr>
-        <p:style>
-          <a:lnRef idx="2">
-            <a:schemeClr val="accent1">
-              <a:shade val="50000"/>
-            </a:schemeClr>
-          </a:lnRef>
-          <a:fillRef idx="1">
-            <a:schemeClr val="accent1"/>
-          </a:fillRef>
-          <a:effectRef idx="0">
-            <a:schemeClr val="accent1"/>
-          </a:effectRef>
-          <a:fontRef idx="minor">
-            <a:schemeClr val="lt1"/>
-          </a:fontRef>
-        </p:style>
-        <p:txBody>
-          <a:bodyPr rtlCol="0" anchor="ctr"/>
-          <a:lstStyle/>
-          <a:p>
-            <a:pPr algn="ctr"/>
-            <a:endParaRPr lang="en-US"/>
-          </a:p>
-        </p:txBody>
-      </p:sp>
     </p:spTree>
     <p:extLst>
       <p:ext uri="{BB962C8B-B14F-4D97-AF65-F5344CB8AC3E}">
@@ -7506,7 +4524,7 @@
 </p:sld>
 </file>
 
-<file path=ppt/slides/slide8.xml><?xml version="1.0" encoding="utf-8"?>
+<file path=ppt/slides/slide7.xml><?xml version="1.0" encoding="utf-8"?>
 <p:sld xmlns:a="http://schemas.openxmlformats.org/drawingml/2006/main" xmlns:r="http://schemas.openxmlformats.org/officeDocument/2006/relationships" xmlns:p="http://schemas.openxmlformats.org/presentationml/2006/main">
   <p:cSld>
     <p:bg>
@@ -7576,13 +4594,6 @@
             </a:stretch>
           </a:blipFill>
         </p:spPr>
-        <p:txBody>
-          <a:bodyPr/>
-          <a:lstStyle/>
-          <a:p>
-            <a:endParaRPr lang="de-DE"/>
-          </a:p>
-        </p:txBody>
       </p:sp>
       <p:grpSp>
         <p:nvGrpSpPr>
@@ -7648,13 +4659,6 @@
               <a:srgbClr val="F8EFE5"/>
             </a:solidFill>
           </p:spPr>
-          <p:txBody>
-            <a:bodyPr/>
-            <a:lstStyle/>
-            <a:p>
-              <a:endParaRPr lang="de-DE"/>
-            </a:p>
-          </p:txBody>
         </p:sp>
         <p:sp>
           <p:nvSpPr>
@@ -7730,13 +4734,6 @@
             </a:stretch>
           </a:blipFill>
         </p:spPr>
-        <p:txBody>
-          <a:bodyPr/>
-          <a:lstStyle/>
-          <a:p>
-            <a:endParaRPr lang="de-DE"/>
-          </a:p>
-        </p:txBody>
       </p:sp>
       <p:sp>
         <p:nvSpPr>
@@ -7783,13 +4780,6 @@
             </a:stretch>
           </a:blipFill>
         </p:spPr>
-        <p:txBody>
-          <a:bodyPr/>
-          <a:lstStyle/>
-          <a:p>
-            <a:endParaRPr lang="de-DE"/>
-          </a:p>
-        </p:txBody>
       </p:sp>
       <p:sp>
         <p:nvSpPr>
@@ -7836,13 +4826,6 @@
             </a:stretch>
           </a:blipFill>
         </p:spPr>
-        <p:txBody>
-          <a:bodyPr/>
-          <a:lstStyle/>
-          <a:p>
-            <a:endParaRPr lang="de-DE"/>
-          </a:p>
-        </p:txBody>
       </p:sp>
       <p:sp>
         <p:nvSpPr>
@@ -7889,13 +4872,6 @@
             </a:stretch>
           </a:blipFill>
         </p:spPr>
-        <p:txBody>
-          <a:bodyPr/>
-          <a:lstStyle/>
-          <a:p>
-            <a:endParaRPr lang="de-DE"/>
-          </a:p>
-        </p:txBody>
       </p:sp>
       <p:sp>
         <p:nvSpPr>
@@ -7942,13 +4918,6 @@
             </a:stretch>
           </a:blipFill>
         </p:spPr>
-        <p:txBody>
-          <a:bodyPr/>
-          <a:lstStyle/>
-          <a:p>
-            <a:endParaRPr lang="de-DE"/>
-          </a:p>
-        </p:txBody>
       </p:sp>
       <p:sp>
         <p:nvSpPr>
@@ -7995,13 +4964,6 @@
             </a:stretch>
           </a:blipFill>
         </p:spPr>
-        <p:txBody>
-          <a:bodyPr/>
-          <a:lstStyle/>
-          <a:p>
-            <a:endParaRPr lang="de-DE"/>
-          </a:p>
-        </p:txBody>
       </p:sp>
       <p:sp>
         <p:nvSpPr>
@@ -8048,13 +5010,6 @@
             </a:stretch>
           </a:blipFill>
         </p:spPr>
-        <p:txBody>
-          <a:bodyPr/>
-          <a:lstStyle/>
-          <a:p>
-            <a:endParaRPr lang="de-DE"/>
-          </a:p>
-        </p:txBody>
       </p:sp>
       <p:sp>
         <p:nvSpPr>
@@ -8142,756 +5097,8 @@
             </a:stretch>
           </a:blipFill>
         </p:spPr>
-        <p:txBody>
-          <a:bodyPr/>
-          <a:lstStyle/>
-          <a:p>
-            <a:endParaRPr lang="de-DE"/>
-          </a:p>
-        </p:txBody>
       </p:sp>
     </p:spTree>
-  </p:cSld>
-  <p:clrMapOvr>
-    <a:masterClrMapping/>
-  </p:clrMapOvr>
-</p:sld>
-</file>
-
-<file path=ppt/slides/slide9.xml><?xml version="1.0" encoding="utf-8"?>
-<p:sld xmlns:a="http://schemas.openxmlformats.org/drawingml/2006/main" xmlns:r="http://schemas.openxmlformats.org/officeDocument/2006/relationships" xmlns:p="http://schemas.openxmlformats.org/presentationml/2006/main">
-  <p:cSld>
-    <p:bg>
-      <p:bgPr>
-        <a:solidFill>
-          <a:srgbClr val="EFDBC7"/>
-        </a:solidFill>
-        <a:effectLst/>
-      </p:bgPr>
-    </p:bg>
-    <p:spTree>
-      <p:nvGrpSpPr>
-        <p:cNvPr id="1" name="">
-          <a:extLst>
-            <a:ext uri="{FF2B5EF4-FFF2-40B4-BE49-F238E27FC236}">
-              <a16:creationId xmlns:a16="http://schemas.microsoft.com/office/drawing/2014/main" id="{EB4FC79B-FAF1-94C6-657D-B0A53F2FA9C2}"/>
-            </a:ext>
-          </a:extLst>
-        </p:cNvPr>
-        <p:cNvGrpSpPr/>
-        <p:nvPr/>
-      </p:nvGrpSpPr>
-      <p:grpSpPr>
-        <a:xfrm>
-          <a:off x="0" y="0"/>
-          <a:ext cx="0" cy="0"/>
-          <a:chOff x="0" y="0"/>
-          <a:chExt cx="0" cy="0"/>
-        </a:xfrm>
-      </p:grpSpPr>
-      <p:sp>
-        <p:nvSpPr>
-          <p:cNvPr id="2" name="Freeform 2">
-            <a:extLst>
-              <a:ext uri="{FF2B5EF4-FFF2-40B4-BE49-F238E27FC236}">
-                <a16:creationId xmlns:a16="http://schemas.microsoft.com/office/drawing/2014/main" id="{46DA6A4A-1897-937B-3B26-F30FEA39BA2C}"/>
-              </a:ext>
-            </a:extLst>
-          </p:cNvPr>
-          <p:cNvSpPr/>
-          <p:nvPr/>
-        </p:nvSpPr>
-        <p:spPr>
-          <a:xfrm rot="451156">
-            <a:off x="16046740" y="1125958"/>
-            <a:ext cx="1868693" cy="5816944"/>
-          </a:xfrm>
-          <a:custGeom>
-            <a:avLst/>
-            <a:gdLst/>
-            <a:ahLst/>
-            <a:cxnLst/>
-            <a:rect l="l" t="t" r="r" b="b"/>
-            <a:pathLst>
-              <a:path w="1868693" h="5816944">
-                <a:moveTo>
-                  <a:pt x="0" y="0"/>
-                </a:moveTo>
-                <a:lnTo>
-                  <a:pt x="1868693" y="0"/>
-                </a:lnTo>
-                <a:lnTo>
-                  <a:pt x="1868693" y="5816944"/>
-                </a:lnTo>
-                <a:lnTo>
-                  <a:pt x="0" y="5816944"/>
-                </a:lnTo>
-                <a:lnTo>
-                  <a:pt x="0" y="0"/>
-                </a:lnTo>
-                <a:close/>
-              </a:path>
-            </a:pathLst>
-          </a:custGeom>
-          <a:blipFill>
-            <a:blip r:embed="rId2"/>
-            <a:stretch>
-              <a:fillRect/>
-            </a:stretch>
-          </a:blipFill>
-        </p:spPr>
-        <p:txBody>
-          <a:bodyPr/>
-          <a:lstStyle/>
-          <a:p>
-            <a:endParaRPr lang="de-DE"/>
-          </a:p>
-        </p:txBody>
-      </p:sp>
-      <p:grpSp>
-        <p:nvGrpSpPr>
-          <p:cNvPr id="3" name="Group 3">
-            <a:extLst>
-              <a:ext uri="{FF2B5EF4-FFF2-40B4-BE49-F238E27FC236}">
-                <a16:creationId xmlns:a16="http://schemas.microsoft.com/office/drawing/2014/main" id="{AC5F5291-2659-E5D0-BAD4-AF8CC0E052C9}"/>
-              </a:ext>
-            </a:extLst>
-          </p:cNvPr>
-          <p:cNvGrpSpPr/>
-          <p:nvPr/>
-        </p:nvGrpSpPr>
-        <p:grpSpPr>
-          <a:xfrm>
-            <a:off x="4178434" y="1280565"/>
-            <a:ext cx="9922732" cy="7725870"/>
-            <a:chOff x="0" y="0"/>
-            <a:chExt cx="2613395" cy="2034797"/>
-          </a:xfrm>
-        </p:grpSpPr>
-        <p:sp>
-          <p:nvSpPr>
-            <p:cNvPr id="4" name="Freeform 4">
-              <a:extLst>
-                <a:ext uri="{FF2B5EF4-FFF2-40B4-BE49-F238E27FC236}">
-                  <a16:creationId xmlns:a16="http://schemas.microsoft.com/office/drawing/2014/main" id="{1BD22E70-1EDC-BBF6-3043-7A3CD0FA39FB}"/>
-                </a:ext>
-              </a:extLst>
-            </p:cNvPr>
-            <p:cNvSpPr/>
-            <p:nvPr/>
-          </p:nvSpPr>
-          <p:spPr>
-            <a:xfrm>
-              <a:off x="0" y="0"/>
-              <a:ext cx="2613395" cy="2034797"/>
-            </a:xfrm>
-            <a:custGeom>
-              <a:avLst/>
-              <a:gdLst/>
-              <a:ahLst/>
-              <a:cxnLst/>
-              <a:rect l="l" t="t" r="r" b="b"/>
-              <a:pathLst>
-                <a:path w="2613395" h="2034797">
-                  <a:moveTo>
-                    <a:pt x="1306697" y="0"/>
-                  </a:moveTo>
-                  <a:cubicBezTo>
-                    <a:pt x="585028" y="0"/>
-                    <a:pt x="0" y="455505"/>
-                    <a:pt x="0" y="1017399"/>
-                  </a:cubicBezTo>
-                  <a:cubicBezTo>
-                    <a:pt x="0" y="1579292"/>
-                    <a:pt x="585028" y="2034797"/>
-                    <a:pt x="1306697" y="2034797"/>
-                  </a:cubicBezTo>
-                  <a:cubicBezTo>
-                    <a:pt x="2028366" y="2034797"/>
-                    <a:pt x="2613395" y="1579292"/>
-                    <a:pt x="2613395" y="1017399"/>
-                  </a:cubicBezTo>
-                  <a:cubicBezTo>
-                    <a:pt x="2613395" y="455505"/>
-                    <a:pt x="2028366" y="0"/>
-                    <a:pt x="1306697" y="0"/>
-                  </a:cubicBezTo>
-                  <a:close/>
-                </a:path>
-              </a:pathLst>
-            </a:custGeom>
-            <a:solidFill>
-              <a:srgbClr val="F8EFE5"/>
-            </a:solidFill>
-          </p:spPr>
-          <p:txBody>
-            <a:bodyPr/>
-            <a:lstStyle/>
-            <a:p>
-              <a:endParaRPr lang="de-DE"/>
-            </a:p>
-          </p:txBody>
-        </p:sp>
-        <p:sp>
-          <p:nvSpPr>
-            <p:cNvPr id="5" name="TextBox 5">
-              <a:extLst>
-                <a:ext uri="{FF2B5EF4-FFF2-40B4-BE49-F238E27FC236}">
-                  <a16:creationId xmlns:a16="http://schemas.microsoft.com/office/drawing/2014/main" id="{115ECD1C-2231-5570-F0AF-10B224B537A7}"/>
-                </a:ext>
-              </a:extLst>
-            </p:cNvPr>
-            <p:cNvSpPr txBox="1"/>
-            <p:nvPr/>
-          </p:nvSpPr>
-          <p:spPr>
-            <a:xfrm>
-              <a:off x="245006" y="162187"/>
-              <a:ext cx="2123383" cy="1681848"/>
-            </a:xfrm>
-            <a:prstGeom prst="rect">
-              <a:avLst/>
-            </a:prstGeom>
-          </p:spPr>
-          <p:txBody>
-            <a:bodyPr lIns="50800" tIns="50800" rIns="50800" bIns="50800" rtlCol="0" anchor="ctr"/>
-            <a:lstStyle/>
-            <a:p>
-              <a:pPr algn="ctr">
-                <a:lnSpc>
-                  <a:spcPts val="2659"/>
-                </a:lnSpc>
-              </a:pPr>
-              <a:endParaRPr/>
-            </a:p>
-          </p:txBody>
-        </p:sp>
-      </p:grpSp>
-      <p:sp>
-        <p:nvSpPr>
-          <p:cNvPr id="6" name="Freeform 6">
-            <a:extLst>
-              <a:ext uri="{FF2B5EF4-FFF2-40B4-BE49-F238E27FC236}">
-                <a16:creationId xmlns:a16="http://schemas.microsoft.com/office/drawing/2014/main" id="{84907D67-E794-CA0C-E688-269765228DE0}"/>
-              </a:ext>
-            </a:extLst>
-          </p:cNvPr>
-          <p:cNvSpPr/>
-          <p:nvPr/>
-        </p:nvSpPr>
-        <p:spPr>
-          <a:xfrm>
-            <a:off x="14101166" y="-1797501"/>
-            <a:ext cx="3158134" cy="4618842"/>
-          </a:xfrm>
-          <a:custGeom>
-            <a:avLst/>
-            <a:gdLst/>
-            <a:ahLst/>
-            <a:cxnLst/>
-            <a:rect l="l" t="t" r="r" b="b"/>
-            <a:pathLst>
-              <a:path w="3158134" h="4618842">
-                <a:moveTo>
-                  <a:pt x="0" y="0"/>
-                </a:moveTo>
-                <a:lnTo>
-                  <a:pt x="3158134" y="0"/>
-                </a:lnTo>
-                <a:lnTo>
-                  <a:pt x="3158134" y="4618843"/>
-                </a:lnTo>
-                <a:lnTo>
-                  <a:pt x="0" y="4618843"/>
-                </a:lnTo>
-                <a:lnTo>
-                  <a:pt x="0" y="0"/>
-                </a:lnTo>
-                <a:close/>
-              </a:path>
-            </a:pathLst>
-          </a:custGeom>
-          <a:blipFill>
-            <a:blip r:embed="rId3"/>
-            <a:stretch>
-              <a:fillRect/>
-            </a:stretch>
-          </a:blipFill>
-        </p:spPr>
-        <p:txBody>
-          <a:bodyPr/>
-          <a:lstStyle/>
-          <a:p>
-            <a:endParaRPr lang="de-DE"/>
-          </a:p>
-        </p:txBody>
-      </p:sp>
-      <p:sp>
-        <p:nvSpPr>
-          <p:cNvPr id="7" name="Freeform 7">
-            <a:extLst>
-              <a:ext uri="{FF2B5EF4-FFF2-40B4-BE49-F238E27FC236}">
-                <a16:creationId xmlns:a16="http://schemas.microsoft.com/office/drawing/2014/main" id="{A2B0792C-861B-AA66-1AE8-6A812CBFE75C}"/>
-              </a:ext>
-            </a:extLst>
-          </p:cNvPr>
-          <p:cNvSpPr/>
-          <p:nvPr/>
-        </p:nvSpPr>
-        <p:spPr>
-          <a:xfrm rot="729829">
-            <a:off x="-331243" y="6148586"/>
-            <a:ext cx="3698126" cy="4448874"/>
-          </a:xfrm>
-          <a:custGeom>
-            <a:avLst/>
-            <a:gdLst/>
-            <a:ahLst/>
-            <a:cxnLst/>
-            <a:rect l="l" t="t" r="r" b="b"/>
-            <a:pathLst>
-              <a:path w="3698126" h="4448874">
-                <a:moveTo>
-                  <a:pt x="0" y="0"/>
-                </a:moveTo>
-                <a:lnTo>
-                  <a:pt x="3698127" y="0"/>
-                </a:lnTo>
-                <a:lnTo>
-                  <a:pt x="3698127" y="4448874"/>
-                </a:lnTo>
-                <a:lnTo>
-                  <a:pt x="0" y="4448874"/>
-                </a:lnTo>
-                <a:lnTo>
-                  <a:pt x="0" y="0"/>
-                </a:lnTo>
-                <a:close/>
-              </a:path>
-            </a:pathLst>
-          </a:custGeom>
-          <a:blipFill>
-            <a:blip r:embed="rId4"/>
-            <a:stretch>
-              <a:fillRect/>
-            </a:stretch>
-          </a:blipFill>
-        </p:spPr>
-        <p:txBody>
-          <a:bodyPr/>
-          <a:lstStyle/>
-          <a:p>
-            <a:endParaRPr lang="de-DE"/>
-          </a:p>
-        </p:txBody>
-      </p:sp>
-      <p:sp>
-        <p:nvSpPr>
-          <p:cNvPr id="8" name="Freeform 8">
-            <a:extLst>
-              <a:ext uri="{FF2B5EF4-FFF2-40B4-BE49-F238E27FC236}">
-                <a16:creationId xmlns:a16="http://schemas.microsoft.com/office/drawing/2014/main" id="{45586D50-2197-9602-1C5A-9DA5CD8185BF}"/>
-              </a:ext>
-            </a:extLst>
-          </p:cNvPr>
-          <p:cNvSpPr/>
-          <p:nvPr/>
-        </p:nvSpPr>
-        <p:spPr>
-          <a:xfrm rot="-161141">
-            <a:off x="13738165" y="7250138"/>
-            <a:ext cx="3872014" cy="2865290"/>
-          </a:xfrm>
-          <a:custGeom>
-            <a:avLst/>
-            <a:gdLst/>
-            <a:ahLst/>
-            <a:cxnLst/>
-            <a:rect l="l" t="t" r="r" b="b"/>
-            <a:pathLst>
-              <a:path w="3872014" h="2865290">
-                <a:moveTo>
-                  <a:pt x="0" y="0"/>
-                </a:moveTo>
-                <a:lnTo>
-                  <a:pt x="3872014" y="0"/>
-                </a:lnTo>
-                <a:lnTo>
-                  <a:pt x="3872014" y="2865290"/>
-                </a:lnTo>
-                <a:lnTo>
-                  <a:pt x="0" y="2865290"/>
-                </a:lnTo>
-                <a:lnTo>
-                  <a:pt x="0" y="0"/>
-                </a:lnTo>
-                <a:close/>
-              </a:path>
-            </a:pathLst>
-          </a:custGeom>
-          <a:blipFill>
-            <a:blip r:embed="rId5"/>
-            <a:stretch>
-              <a:fillRect/>
-            </a:stretch>
-          </a:blipFill>
-        </p:spPr>
-        <p:txBody>
-          <a:bodyPr/>
-          <a:lstStyle/>
-          <a:p>
-            <a:endParaRPr lang="de-DE"/>
-          </a:p>
-        </p:txBody>
-      </p:sp>
-      <p:sp>
-        <p:nvSpPr>
-          <p:cNvPr id="9" name="Freeform 9">
-            <a:extLst>
-              <a:ext uri="{FF2B5EF4-FFF2-40B4-BE49-F238E27FC236}">
-                <a16:creationId xmlns:a16="http://schemas.microsoft.com/office/drawing/2014/main" id="{7FD05665-6ACC-C235-2C32-DC55BF919630}"/>
-              </a:ext>
-            </a:extLst>
-          </p:cNvPr>
-          <p:cNvSpPr/>
-          <p:nvPr/>
-        </p:nvSpPr>
-        <p:spPr>
-          <a:xfrm rot="3939658">
-            <a:off x="2106050" y="-98087"/>
-            <a:ext cx="1435904" cy="1648096"/>
-          </a:xfrm>
-          <a:custGeom>
-            <a:avLst/>
-            <a:gdLst/>
-            <a:ahLst/>
-            <a:cxnLst/>
-            <a:rect l="l" t="t" r="r" b="b"/>
-            <a:pathLst>
-              <a:path w="1435904" h="1648096">
-                <a:moveTo>
-                  <a:pt x="0" y="0"/>
-                </a:moveTo>
-                <a:lnTo>
-                  <a:pt x="1435904" y="0"/>
-                </a:lnTo>
-                <a:lnTo>
-                  <a:pt x="1435904" y="1648096"/>
-                </a:lnTo>
-                <a:lnTo>
-                  <a:pt x="0" y="1648096"/>
-                </a:lnTo>
-                <a:lnTo>
-                  <a:pt x="0" y="0"/>
-                </a:lnTo>
-                <a:close/>
-              </a:path>
-            </a:pathLst>
-          </a:custGeom>
-          <a:blipFill>
-            <a:blip r:embed="rId6"/>
-            <a:stretch>
-              <a:fillRect/>
-            </a:stretch>
-          </a:blipFill>
-        </p:spPr>
-        <p:txBody>
-          <a:bodyPr/>
-          <a:lstStyle/>
-          <a:p>
-            <a:endParaRPr lang="de-DE"/>
-          </a:p>
-        </p:txBody>
-      </p:sp>
-      <p:sp>
-        <p:nvSpPr>
-          <p:cNvPr id="10" name="Freeform 10">
-            <a:extLst>
-              <a:ext uri="{FF2B5EF4-FFF2-40B4-BE49-F238E27FC236}">
-                <a16:creationId xmlns:a16="http://schemas.microsoft.com/office/drawing/2014/main" id="{DDA97F4C-DBA1-CF8A-62DD-420AEA41F55C}"/>
-              </a:ext>
-            </a:extLst>
-          </p:cNvPr>
-          <p:cNvSpPr/>
-          <p:nvPr/>
-        </p:nvSpPr>
-        <p:spPr>
-          <a:xfrm rot="-2238453" flipH="1">
-            <a:off x="3043109" y="9423951"/>
-            <a:ext cx="892396" cy="1024271"/>
-          </a:xfrm>
-          <a:custGeom>
-            <a:avLst/>
-            <a:gdLst/>
-            <a:ahLst/>
-            <a:cxnLst/>
-            <a:rect l="l" t="t" r="r" b="b"/>
-            <a:pathLst>
-              <a:path w="892396" h="1024271">
-                <a:moveTo>
-                  <a:pt x="892396" y="0"/>
-                </a:moveTo>
-                <a:lnTo>
-                  <a:pt x="0" y="0"/>
-                </a:lnTo>
-                <a:lnTo>
-                  <a:pt x="0" y="1024271"/>
-                </a:lnTo>
-                <a:lnTo>
-                  <a:pt x="892396" y="1024271"/>
-                </a:lnTo>
-                <a:lnTo>
-                  <a:pt x="892396" y="0"/>
-                </a:lnTo>
-                <a:close/>
-              </a:path>
-            </a:pathLst>
-          </a:custGeom>
-          <a:blipFill>
-            <a:blip r:embed="rId6"/>
-            <a:stretch>
-              <a:fillRect/>
-            </a:stretch>
-          </a:blipFill>
-        </p:spPr>
-        <p:txBody>
-          <a:bodyPr/>
-          <a:lstStyle/>
-          <a:p>
-            <a:endParaRPr lang="de-DE"/>
-          </a:p>
-        </p:txBody>
-      </p:sp>
-      <p:sp>
-        <p:nvSpPr>
-          <p:cNvPr id="11" name="Freeform 11">
-            <a:extLst>
-              <a:ext uri="{FF2B5EF4-FFF2-40B4-BE49-F238E27FC236}">
-                <a16:creationId xmlns:a16="http://schemas.microsoft.com/office/drawing/2014/main" id="{73CE74F3-A76A-2C7D-8B54-E5F30B92A8FC}"/>
-              </a:ext>
-            </a:extLst>
-          </p:cNvPr>
-          <p:cNvSpPr/>
-          <p:nvPr/>
-        </p:nvSpPr>
-        <p:spPr>
-          <a:xfrm rot="-7004280">
-            <a:off x="-310402" y="-570785"/>
-            <a:ext cx="1886615" cy="2165412"/>
-          </a:xfrm>
-          <a:custGeom>
-            <a:avLst/>
-            <a:gdLst/>
-            <a:ahLst/>
-            <a:cxnLst/>
-            <a:rect l="l" t="t" r="r" b="b"/>
-            <a:pathLst>
-              <a:path w="1886615" h="2165412">
-                <a:moveTo>
-                  <a:pt x="0" y="0"/>
-                </a:moveTo>
-                <a:lnTo>
-                  <a:pt x="1886615" y="0"/>
-                </a:lnTo>
-                <a:lnTo>
-                  <a:pt x="1886615" y="2165411"/>
-                </a:lnTo>
-                <a:lnTo>
-                  <a:pt x="0" y="2165411"/>
-                </a:lnTo>
-                <a:lnTo>
-                  <a:pt x="0" y="0"/>
-                </a:lnTo>
-                <a:close/>
-              </a:path>
-            </a:pathLst>
-          </a:custGeom>
-          <a:blipFill>
-            <a:blip r:embed="rId6"/>
-            <a:stretch>
-              <a:fillRect/>
-            </a:stretch>
-          </a:blipFill>
-        </p:spPr>
-        <p:txBody>
-          <a:bodyPr/>
-          <a:lstStyle/>
-          <a:p>
-            <a:endParaRPr lang="de-DE"/>
-          </a:p>
-        </p:txBody>
-      </p:sp>
-      <p:sp>
-        <p:nvSpPr>
-          <p:cNvPr id="12" name="Freeform 12">
-            <a:extLst>
-              <a:ext uri="{FF2B5EF4-FFF2-40B4-BE49-F238E27FC236}">
-                <a16:creationId xmlns:a16="http://schemas.microsoft.com/office/drawing/2014/main" id="{82F6C081-CC26-EDB8-BC0D-5747C285C130}"/>
-              </a:ext>
-            </a:extLst>
-          </p:cNvPr>
-          <p:cNvSpPr/>
-          <p:nvPr/>
-        </p:nvSpPr>
-        <p:spPr>
-          <a:xfrm rot="1334459" flipH="1">
-            <a:off x="-904437" y="2190700"/>
-            <a:ext cx="3074684" cy="3660339"/>
-          </a:xfrm>
-          <a:custGeom>
-            <a:avLst/>
-            <a:gdLst/>
-            <a:ahLst/>
-            <a:cxnLst/>
-            <a:rect l="l" t="t" r="r" b="b"/>
-            <a:pathLst>
-              <a:path w="3074684" h="3660339">
-                <a:moveTo>
-                  <a:pt x="3074684" y="0"/>
-                </a:moveTo>
-                <a:lnTo>
-                  <a:pt x="0" y="0"/>
-                </a:lnTo>
-                <a:lnTo>
-                  <a:pt x="0" y="3660339"/>
-                </a:lnTo>
-                <a:lnTo>
-                  <a:pt x="3074684" y="3660339"/>
-                </a:lnTo>
-                <a:lnTo>
-                  <a:pt x="3074684" y="0"/>
-                </a:lnTo>
-                <a:close/>
-              </a:path>
-            </a:pathLst>
-          </a:custGeom>
-          <a:blipFill>
-            <a:blip r:embed="rId7"/>
-            <a:stretch>
-              <a:fillRect/>
-            </a:stretch>
-          </a:blipFill>
-        </p:spPr>
-        <p:txBody>
-          <a:bodyPr/>
-          <a:lstStyle/>
-          <a:p>
-            <a:endParaRPr lang="de-DE"/>
-          </a:p>
-        </p:txBody>
-      </p:sp>
-      <p:sp>
-        <p:nvSpPr>
-          <p:cNvPr id="13" name="TextBox 13">
-            <a:extLst>
-              <a:ext uri="{FF2B5EF4-FFF2-40B4-BE49-F238E27FC236}">
-                <a16:creationId xmlns:a16="http://schemas.microsoft.com/office/drawing/2014/main" id="{D5D6E7BE-68D9-DA3C-7545-91CC1B283A6B}"/>
-              </a:ext>
-            </a:extLst>
-          </p:cNvPr>
-          <p:cNvSpPr txBox="1"/>
-          <p:nvPr/>
-        </p:nvSpPr>
-        <p:spPr>
-          <a:xfrm>
-            <a:off x="4898981" y="3069081"/>
-            <a:ext cx="8481639" cy="4853957"/>
-          </a:xfrm>
-          <a:prstGeom prst="rect">
-            <a:avLst/>
-          </a:prstGeom>
-        </p:spPr>
-        <p:txBody>
-          <a:bodyPr lIns="0" tIns="0" rIns="0" bIns="0" rtlCol="0" anchor="t">
-            <a:spAutoFit/>
-          </a:bodyPr>
-          <a:lstStyle/>
-          <a:p>
-            <a:pPr algn="ctr">
-              <a:lnSpc>
-                <a:spcPts val="18978"/>
-              </a:lnSpc>
-            </a:pPr>
-            <a:r>
-              <a:rPr lang="en-US" sz="15815" dirty="0">
-                <a:solidFill>
-                  <a:srgbClr val="3B191D"/>
-                </a:solidFill>
-                <a:latin typeface="Loubag"/>
-                <a:ea typeface="Loubag"/>
-                <a:cs typeface="Loubag"/>
-                <a:sym typeface="Loubag"/>
-              </a:rPr>
-              <a:t>Bonus Stats</a:t>
-            </a:r>
-          </a:p>
-        </p:txBody>
-      </p:sp>
-      <p:sp>
-        <p:nvSpPr>
-          <p:cNvPr id="14" name="Freeform 14">
-            <a:extLst>
-              <a:ext uri="{FF2B5EF4-FFF2-40B4-BE49-F238E27FC236}">
-                <a16:creationId xmlns:a16="http://schemas.microsoft.com/office/drawing/2014/main" id="{55A82962-FEB4-E29B-1D19-D5293474E2F5}"/>
-              </a:ext>
-            </a:extLst>
-          </p:cNvPr>
-          <p:cNvSpPr/>
-          <p:nvPr/>
-        </p:nvSpPr>
-        <p:spPr>
-          <a:xfrm rot="-2238453" flipH="1">
-            <a:off x="4089811" y="-651993"/>
-            <a:ext cx="892396" cy="1024271"/>
-          </a:xfrm>
-          <a:custGeom>
-            <a:avLst/>
-            <a:gdLst/>
-            <a:ahLst/>
-            <a:cxnLst/>
-            <a:rect l="l" t="t" r="r" b="b"/>
-            <a:pathLst>
-              <a:path w="892396" h="1024271">
-                <a:moveTo>
-                  <a:pt x="892396" y="0"/>
-                </a:moveTo>
-                <a:lnTo>
-                  <a:pt x="0" y="0"/>
-                </a:lnTo>
-                <a:lnTo>
-                  <a:pt x="0" y="1024271"/>
-                </a:lnTo>
-                <a:lnTo>
-                  <a:pt x="892396" y="1024271"/>
-                </a:lnTo>
-                <a:lnTo>
-                  <a:pt x="892396" y="0"/>
-                </a:lnTo>
-                <a:close/>
-              </a:path>
-            </a:pathLst>
-          </a:custGeom>
-          <a:blipFill>
-            <a:blip r:embed="rId6"/>
-            <a:stretch>
-              <a:fillRect/>
-            </a:stretch>
-          </a:blipFill>
-        </p:spPr>
-        <p:txBody>
-          <a:bodyPr/>
-          <a:lstStyle/>
-          <a:p>
-            <a:endParaRPr lang="de-DE"/>
-          </a:p>
-        </p:txBody>
-      </p:sp>
-    </p:spTree>
-    <p:extLst>
-      <p:ext uri="{BB962C8B-B14F-4D97-AF65-F5344CB8AC3E}">
-        <p14:creationId xmlns:p14="http://schemas.microsoft.com/office/powerpoint/2010/main" val="113354851"/>
-      </p:ext>
-    </p:extLst>
   </p:cSld>
   <p:clrMapOvr>
     <a:masterClrMapping/>

</xml_diff>